<commit_message>
update report and nav-bar
update report and nav-bar
</commit_message>
<xml_diff>
--- a/G2_T11707E0_Project_Report.pptx
+++ b/G2_T11707E0_Project_Report.pptx
@@ -3666,8 +3666,12 @@
         <a:lstStyle/>
         <a:p>
           <a:r>
+            <a:rPr lang="en-US" sz="1400" dirty="0" err="1"/>
+            <a:t>Category+Shop</a:t>
+          </a:r>
+          <a:r>
             <a:rPr lang="en-US" sz="1400" dirty="0"/>
-            <a:t>Shop: search, order, recommend product, manage product (insert, update, delete, …) </a:t>
+            <a:t>: search, order, recommend product, manage product (insert, update, delete, …) </a:t>
           </a:r>
         </a:p>
       </dgm:t>
@@ -3772,7 +3776,7 @@
       <dgm:spPr/>
     </dgm:pt>
     <dgm:pt modelId="{43FDAC41-7B8B-4692-AF55-822E8F8FEBBD}" type="pres">
-      <dgm:prSet presAssocID="{FBBEC36F-FB7D-4962-ADE6-14810757DD0D}" presName="rect1" presStyleLbl="trAlignAcc1" presStyleIdx="1" presStyleCnt="3" custScaleX="168138">
+      <dgm:prSet presAssocID="{FBBEC36F-FB7D-4962-ADE6-14810757DD0D}" presName="rect1" presStyleLbl="trAlignAcc1" presStyleIdx="1" presStyleCnt="3" custScaleX="168138" custLinFactNeighborX="-871" custLinFactNeighborY="979">
         <dgm:presLayoutVars>
           <dgm:bulletEnabled val="1"/>
         </dgm:presLayoutVars>
@@ -5229,7 +5233,7 @@
       </dsp:nvSpPr>
       <dsp:spPr>
         <a:xfrm>
-          <a:off x="627061" y="2044012"/>
+          <a:off x="588953" y="2057398"/>
           <a:ext cx="7356476" cy="1367269"/>
         </a:xfrm>
         <a:prstGeom prst="rect">
@@ -5288,13 +5292,17 @@
             <a:buNone/>
           </a:pPr>
           <a:r>
+            <a:rPr lang="en-US" sz="1400" kern="1200" dirty="0" err="1"/>
+            <a:t>Category+Shop</a:t>
+          </a:r>
+          <a:r>
             <a:rPr lang="en-US" sz="1400" kern="1200" dirty="0"/>
-            <a:t>Shop: search, order, recommend product, manage product (insert, update, delete, …) </a:t>
+            <a:t>: search, order, recommend product, manage product (insert, update, delete, …) </a:t>
           </a:r>
         </a:p>
       </dsp:txBody>
       <dsp:txXfrm>
-        <a:off x="627061" y="2044012"/>
+        <a:off x="588953" y="2057398"/>
         <a:ext cx="7356476" cy="1367269"/>
       </dsp:txXfrm>
     </dsp:sp>
@@ -10521,7 +10529,7 @@
               <a:pPr>
                 <a:defRPr/>
               </a:pPr>
-              <a:t>5/2/2019</a:t>
+              <a:t>5/10/2019</a:t>
             </a:fld>
             <a:endParaRPr lang="en-US" dirty="0"/>
           </a:p>
@@ -10787,7 +10795,7 @@
               <a:pPr>
                 <a:defRPr/>
               </a:pPr>
-              <a:t>5/2/2019</a:t>
+              <a:t>5/10/2019</a:t>
             </a:fld>
             <a:endParaRPr lang="en-US" dirty="0"/>
           </a:p>
@@ -13683,15 +13691,6 @@
           <a:bodyPr/>
           <a:lstStyle/>
           <a:p>
-            <a:r>
-              <a:rPr lang="en-US" dirty="0">
-                <a:latin typeface="Times New Roman" panose="02020603050405020304" pitchFamily="18" charset="0"/>
-                <a:cs typeface="Times New Roman" panose="02020603050405020304" pitchFamily="18" charset="0"/>
-              </a:rPr>
-              <a:t>Help…</a:t>
-            </a:r>
-          </a:p>
-          <a:p>
             <a:endParaRPr lang="en-US" dirty="0"/>
           </a:p>
         </p:txBody>
@@ -13835,7 +13834,7 @@
             <p:ph idx="1"/>
             <p:extLst>
               <p:ext uri="{D42A27DB-BD31-4B8C-83A1-F6EECF244321}">
-                <p14:modId xmlns:p14="http://schemas.microsoft.com/office/powerpoint/2010/main" val="3738822729"/>
+                <p14:modId xmlns:p14="http://schemas.microsoft.com/office/powerpoint/2010/main" val="326340194"/>
               </p:ext>
             </p:extLst>
           </p:nvPr>
@@ -14148,13 +14147,10 @@
             <a:pPr eaLnBrk="1" hangingPunct="1">
               <a:defRPr/>
             </a:pPr>
-            <a:r>
-              <a:rPr lang="en-US" dirty="0">
-                <a:latin typeface="Times New Roman" panose="02020603050405020304" pitchFamily="18" charset="0"/>
-                <a:cs typeface="Times New Roman" panose="02020603050405020304" pitchFamily="18" charset="0"/>
-              </a:rPr>
-              <a:t>Help…</a:t>
-            </a:r>
+            <a:endParaRPr lang="en-US" dirty="0">
+              <a:latin typeface="Times New Roman" panose="02020603050405020304" pitchFamily="18" charset="0"/>
+              <a:cs typeface="Times New Roman" panose="02020603050405020304" pitchFamily="18" charset="0"/>
+            </a:endParaRPr>
           </a:p>
         </p:txBody>
       </p:sp>
@@ -17245,15 +17241,6 @@
           <a:bodyPr/>
           <a:lstStyle/>
           <a:p>
-            <a:r>
-              <a:rPr lang="en-US" dirty="0">
-                <a:latin typeface="Times New Roman" panose="02020603050405020304" pitchFamily="18" charset="0"/>
-                <a:cs typeface="Times New Roman" panose="02020603050405020304" pitchFamily="18" charset="0"/>
-              </a:rPr>
-              <a:t>Help…</a:t>
-            </a:r>
-          </a:p>
-          <a:p>
             <a:endParaRPr lang="en-US" dirty="0"/>
           </a:p>
         </p:txBody>
@@ -17395,15 +17382,6 @@
         <p:txBody>
           <a:bodyPr/>
           <a:lstStyle/>
-          <a:p>
-            <a:r>
-              <a:rPr lang="en-US" dirty="0">
-                <a:latin typeface="Times New Roman" panose="02020603050405020304" pitchFamily="18" charset="0"/>
-                <a:cs typeface="Times New Roman" panose="02020603050405020304" pitchFamily="18" charset="0"/>
-              </a:rPr>
-              <a:t>Help…</a:t>
-            </a:r>
-          </a:p>
           <a:p>
             <a:endParaRPr lang="en-US" dirty="0"/>
           </a:p>

</xml_diff>

<commit_message>
report + Giao diện người dùng (phone, address)
</commit_message>
<xml_diff>
--- a/G2_T11707E0_Project_Report.pptx
+++ b/G2_T11707E0_Project_Report.pptx
@@ -5,10 +5,10 @@
     <p:sldMasterId id="2147483662" r:id="rId1"/>
   </p:sldMasterIdLst>
   <p:notesMasterIdLst>
-    <p:notesMasterId r:id="rId16"/>
+    <p:notesMasterId r:id="rId15"/>
   </p:notesMasterIdLst>
   <p:handoutMasterIdLst>
-    <p:handoutMasterId r:id="rId17"/>
+    <p:handoutMasterId r:id="rId16"/>
   </p:handoutMasterIdLst>
   <p:sldIdLst>
     <p:sldId id="321" r:id="rId2"/>
@@ -21,15 +21,14 @@
     <p:sldId id="394" r:id="rId9"/>
     <p:sldId id="395" r:id="rId10"/>
     <p:sldId id="396" r:id="rId11"/>
-    <p:sldId id="397" r:id="rId12"/>
-    <p:sldId id="398" r:id="rId13"/>
-    <p:sldId id="399" r:id="rId14"/>
-    <p:sldId id="400" r:id="rId15"/>
+    <p:sldId id="398" r:id="rId12"/>
+    <p:sldId id="399" r:id="rId13"/>
+    <p:sldId id="400" r:id="rId14"/>
   </p:sldIdLst>
   <p:sldSz cx="9144000" cy="6858000" type="screen4x3"/>
   <p:notesSz cx="6858000" cy="9144000"/>
   <p:custDataLst>
-    <p:tags r:id="rId18"/>
+    <p:tags r:id="rId17"/>
   </p:custDataLst>
   <p:defaultTextStyle>
     <a:defPPr>
@@ -2469,17 +2468,21 @@
           <a:r>
             <a:rPr lang="en-GB" sz="2000" b="1" dirty="0">
               <a:solidFill>
-                <a:srgbClr val="9F1D8C"/>
+                <a:schemeClr val="tx1"/>
               </a:solidFill>
-              <a:latin typeface="+mj-lt"/>
+              <a:latin typeface="Tahoma" panose="020B0604030504040204" pitchFamily="34" charset="0"/>
+              <a:ea typeface="Tahoma" panose="020B0604030504040204" pitchFamily="34" charset="0"/>
+              <a:cs typeface="Tahoma" panose="020B0604030504040204" pitchFamily="34" charset="0"/>
             </a:rPr>
             <a:t>Building a website to enter e-commerce market of Pet</a:t>
           </a:r>
           <a:endParaRPr lang="en-US" sz="2000" b="1" dirty="0">
             <a:solidFill>
-              <a:srgbClr val="9F1D8C"/>
+              <a:schemeClr val="tx1"/>
             </a:solidFill>
-            <a:latin typeface="+mj-lt"/>
+            <a:latin typeface="Tahoma" panose="020B0604030504040204" pitchFamily="34" charset="0"/>
+            <a:ea typeface="Tahoma" panose="020B0604030504040204" pitchFamily="34" charset="0"/>
+            <a:cs typeface="Tahoma" panose="020B0604030504040204" pitchFamily="34" charset="0"/>
           </a:endParaRPr>
         </a:p>
       </dgm:t>
@@ -2530,8 +2533,11 @@
           <a:r>
             <a:rPr lang="en-US" sz="2000" dirty="0">
               <a:solidFill>
-                <a:srgbClr val="9F1D8C"/>
+                <a:schemeClr val="tx1"/>
               </a:solidFill>
+              <a:latin typeface="Tahoma" panose="020B0604030504040204" pitchFamily="34" charset="0"/>
+              <a:ea typeface="Tahoma" panose="020B0604030504040204" pitchFamily="34" charset="0"/>
+              <a:cs typeface="Tahoma" panose="020B0604030504040204" pitchFamily="34" charset="0"/>
             </a:rPr>
             <a:t>Services</a:t>
           </a:r>
@@ -2584,8 +2590,11 @@
           <a:r>
             <a:rPr lang="en-US" sz="2000" dirty="0">
               <a:solidFill>
-                <a:srgbClr val="9F1D8C"/>
+                <a:schemeClr val="tx1"/>
               </a:solidFill>
+              <a:latin typeface="Tahoma" panose="020B0604030504040204" pitchFamily="34" charset="0"/>
+              <a:ea typeface="Tahoma" panose="020B0604030504040204" pitchFamily="34" charset="0"/>
+              <a:cs typeface="Tahoma" panose="020B0604030504040204" pitchFamily="34" charset="0"/>
             </a:rPr>
             <a:t>Shop</a:t>
           </a:r>
@@ -2638,8 +2647,11 @@
           <a:r>
             <a:rPr lang="en-US" sz="2000" dirty="0">
               <a:solidFill>
-                <a:srgbClr val="D119A1"/>
+                <a:schemeClr val="tx1"/>
               </a:solidFill>
+              <a:latin typeface="Tahoma" panose="020B0604030504040204" pitchFamily="34" charset="0"/>
+              <a:ea typeface="Tahoma" panose="020B0604030504040204" pitchFamily="34" charset="0"/>
+              <a:cs typeface="Tahoma" panose="020B0604030504040204" pitchFamily="34" charset="0"/>
             </a:rPr>
             <a:t>Pet Dating</a:t>
           </a:r>
@@ -3146,7 +3158,7 @@
               <a:latin typeface="Bahnschrift Light" panose="020B0502040204020203" pitchFamily="34" charset="0"/>
               <a:cs typeface="Angsana New" panose="02020603050405020304" pitchFamily="18" charset="-34"/>
             </a:rPr>
-            <a:t> IDE 7.4</a:t>
+            <a:t> IDE 8.2</a:t>
           </a:r>
           <a:endParaRPr lang="en-US" sz="1600" dirty="0">
             <a:latin typeface="Bahnschrift Light" panose="020B0502040204020203" pitchFamily="34" charset="0"/>
@@ -3200,7 +3212,7 @@
               <a:latin typeface="Bahnschrift Light" panose="020B0502040204020203" pitchFamily="34" charset="0"/>
               <a:cs typeface="Angsana New" panose="02020603050405020304" pitchFamily="18" charset="-34"/>
             </a:rPr>
-            <a:t> Server 4.0</a:t>
+            <a:t> Server 4.1</a:t>
           </a:r>
           <a:endParaRPr lang="en-US" sz="1600" dirty="0">
             <a:latin typeface="Bahnschrift Light" panose="020B0502040204020203" pitchFamily="34" charset="0"/>
@@ -3294,7 +3306,7 @@
               <a:latin typeface="Bahnschrift Light" panose="020B0502040204020203" pitchFamily="34" charset="0"/>
               <a:cs typeface="Angsana New" panose="02020603050405020304" pitchFamily="18" charset="-34"/>
             </a:rPr>
-            <a:t>Google Chrome 65.0</a:t>
+            <a:t>Google Chrome 74</a:t>
           </a:r>
           <a:endParaRPr lang="en-US" sz="1600" dirty="0">
             <a:latin typeface="Bahnschrift Light" panose="020B0502040204020203" pitchFamily="34" charset="0"/>
@@ -3427,7 +3439,7 @@
             <a:buChar char=""/>
           </a:pPr>
           <a:r>
-            <a:rPr lang="en-GB" sz="1600">
+            <a:rPr lang="en-GB" sz="1600" dirty="0">
               <a:latin typeface="Bahnschrift Light" panose="020B0502040204020203" pitchFamily="34" charset="0"/>
             </a:rPr>
             <a:t>JavaScript</a:t>
@@ -3450,51 +3462,6 @@
       </dgm:t>
     </dgm:pt>
     <dgm:pt modelId="{9131F9FC-DDF4-483D-948A-9ED39A8BC4EB}" type="sibTrans" cxnId="{E301C1E8-CB83-4AF9-91C9-51A392F0661C}">
-      <dgm:prSet/>
-      <dgm:spPr/>
-      <dgm:t>
-        <a:bodyPr/>
-        <a:lstStyle/>
-        <a:p>
-          <a:endParaRPr lang="en-US"/>
-        </a:p>
-      </dgm:t>
-    </dgm:pt>
-    <dgm:pt modelId="{18F5D1D7-B256-402A-BE4D-3BA0916DE8C7}">
-      <dgm:prSet phldrT="[Text]" custT="1"/>
-      <dgm:spPr/>
-      <dgm:t>
-        <a:bodyPr/>
-        <a:lstStyle/>
-        <a:p>
-          <a:pPr>
-            <a:buFont typeface="Symbol" panose="05050102010706020507" pitchFamily="18" charset="2"/>
-            <a:buChar char=""/>
-          </a:pPr>
-          <a:r>
-            <a:rPr lang="en-GB" sz="1600" dirty="0">
-              <a:latin typeface="Bahnschrift Light" panose="020B0502040204020203" pitchFamily="34" charset="0"/>
-            </a:rPr>
-            <a:t>Apache Tiles Framework</a:t>
-          </a:r>
-          <a:endParaRPr lang="en-US" sz="1600" dirty="0">
-            <a:latin typeface="Bahnschrift Light" panose="020B0502040204020203" pitchFamily="34" charset="0"/>
-          </a:endParaRPr>
-        </a:p>
-      </dgm:t>
-    </dgm:pt>
-    <dgm:pt modelId="{5C27BA00-1D9E-45EF-B5BE-2EDE1E34720C}" type="parTrans" cxnId="{55A89F51-0058-4145-8057-8FCD7970E4D2}">
-      <dgm:prSet/>
-      <dgm:spPr/>
-      <dgm:t>
-        <a:bodyPr/>
-        <a:lstStyle/>
-        <a:p>
-          <a:endParaRPr lang="en-US"/>
-        </a:p>
-      </dgm:t>
-    </dgm:pt>
-    <dgm:pt modelId="{6F3581C5-39C9-49CD-8693-98A0C44E5318}" type="sibTrans" cxnId="{55A89F51-0058-4145-8057-8FCD7970E4D2}">
       <dgm:prSet/>
       <dgm:spPr/>
       <dgm:t>
@@ -3552,7 +3519,7 @@
       <dgm:spPr/>
     </dgm:pt>
     <dgm:pt modelId="{5EE3DBB4-4FD8-420F-BB3C-3475EAFAAB39}" type="pres">
-      <dgm:prSet presAssocID="{C81FD910-C6DB-4CDE-84A6-CDE02E8A9EF8}" presName="childShp" presStyleLbl="bgAccFollowNode1" presStyleIdx="1" presStyleCnt="2">
+      <dgm:prSet presAssocID="{C81FD910-C6DB-4CDE-84A6-CDE02E8A9EF8}" presName="childShp" presStyleLbl="bgAccFollowNode1" presStyleIdx="1" presStyleCnt="2" custLinFactNeighborX="575" custLinFactNeighborY="3414">
         <dgm:presLayoutVars>
           <dgm:bulletEnabled val="1"/>
         </dgm:presLayoutVars>
@@ -3568,13 +3535,11 @@
     <dgm:cxn modelId="{490D4166-2F9A-4D7B-984B-114483E47AED}" type="presOf" srcId="{3BDD52EB-DDF1-4F02-8854-2E58D2536744}" destId="{145F20EC-D85A-4899-8690-8200322E45F0}" srcOrd="0" destOrd="0" presId="urn:microsoft.com/office/officeart/2005/8/layout/vList6"/>
     <dgm:cxn modelId="{1BB5996D-78B3-4880-A82E-2112C9D2DAB0}" srcId="{307CF64E-2C1F-4311-B7B8-9877149FA03F}" destId="{7E2B200B-B63F-4C61-BAD4-045C63FA369D}" srcOrd="0" destOrd="0" parTransId="{1B4C7124-93D1-49C0-9D3D-675BFBE01FE3}" sibTransId="{3D47BD02-6403-4FA8-99F4-10CA964AEAF3}"/>
     <dgm:cxn modelId="{D59AD84D-B7B1-49BA-A91D-7844BC792416}" type="presOf" srcId="{A9F4878E-F6BC-43B8-B0A3-D50D38DECF00}" destId="{D8BF2ECE-6A8A-467A-9980-CF11D62D2629}" srcOrd="0" destOrd="5" presId="urn:microsoft.com/office/officeart/2005/8/layout/vList6"/>
-    <dgm:cxn modelId="{55A89F51-0058-4145-8057-8FCD7970E4D2}" srcId="{C81FD910-C6DB-4CDE-84A6-CDE02E8A9EF8}" destId="{18F5D1D7-B256-402A-BE4D-3BA0916DE8C7}" srcOrd="5" destOrd="0" parTransId="{5C27BA00-1D9E-45EF-B5BE-2EDE1E34720C}" sibTransId="{6F3581C5-39C9-49CD-8693-98A0C44E5318}"/>
     <dgm:cxn modelId="{78E1F253-DC4C-490C-A935-E47953BCB5DA}" srcId="{307CF64E-2C1F-4311-B7B8-9877149FA03F}" destId="{B7738D94-32DF-431B-B337-58F8016653F6}" srcOrd="2" destOrd="0" parTransId="{41D3B91A-28EC-4E4D-A2DC-B0A22B421731}" sibTransId="{7F424977-5CA9-45EF-9CAD-13A2CF425E88}"/>
     <dgm:cxn modelId="{12C79575-67E6-401F-B182-80A39E484E89}" srcId="{307CF64E-2C1F-4311-B7B8-9877149FA03F}" destId="{B6F1CAFF-D397-42C0-A396-1D0A9F79E97C}" srcOrd="1" destOrd="0" parTransId="{CD4CABEE-D1B9-45A7-92FC-EA9C334A6D6F}" sibTransId="{E4994548-235C-4A53-AB5F-E9507D8994FB}"/>
     <dgm:cxn modelId="{03BFF778-FCA4-45A2-BD6A-66CAAEAFAF38}" srcId="{307CF64E-2C1F-4311-B7B8-9877149FA03F}" destId="{51CAD3EE-D72B-478F-84A9-368C2444536F}" srcOrd="4" destOrd="0" parTransId="{FAB11103-1106-4B3E-B897-2E877A95F570}" sibTransId="{5A699FAB-34E0-49CF-A5D0-2EF8D031EA3D}"/>
     <dgm:cxn modelId="{632EB182-EAC8-47D9-99D1-0ECD47560D6E}" type="presOf" srcId="{51CAD3EE-D72B-478F-84A9-368C2444536F}" destId="{D8BF2ECE-6A8A-467A-9980-CF11D62D2629}" srcOrd="0" destOrd="4" presId="urn:microsoft.com/office/officeart/2005/8/layout/vList6"/>
     <dgm:cxn modelId="{86405184-9F80-4FAB-A6A6-DB0D68EFF65E}" srcId="{C81FD910-C6DB-4CDE-84A6-CDE02E8A9EF8}" destId="{FB850029-90DB-40EE-8C45-A63380B9FEA8}" srcOrd="1" destOrd="0" parTransId="{AF89B103-BAC3-4BAD-A1F2-9538C67C0133}" sibTransId="{9504DED2-2334-493D-AC66-29DB2320FF5B}"/>
-    <dgm:cxn modelId="{3CFE1093-8AF9-4FBD-A8ED-236077272DE3}" type="presOf" srcId="{18F5D1D7-B256-402A-BE4D-3BA0916DE8C7}" destId="{5EE3DBB4-4FD8-420F-BB3C-3475EAFAAB39}" srcOrd="0" destOrd="5" presId="urn:microsoft.com/office/officeart/2005/8/layout/vList6"/>
     <dgm:cxn modelId="{E6CE5E9D-F9E6-460C-83DA-3ADF00238014}" srcId="{307CF64E-2C1F-4311-B7B8-9877149FA03F}" destId="{0A4FCD7B-17EA-4E34-8EB5-ECC5091BFE44}" srcOrd="3" destOrd="0" parTransId="{7F892181-A48B-428B-826E-2514AD028A59}" sibTransId="{2D195E97-A8A4-4225-A907-E2504219E3E6}"/>
     <dgm:cxn modelId="{F69A8FA6-0934-4FB9-9E40-946C6CB72CBF}" type="presOf" srcId="{FB850029-90DB-40EE-8C45-A63380B9FEA8}" destId="{5EE3DBB4-4FD8-420F-BB3C-3475EAFAAB39}" srcOrd="0" destOrd="1" presId="urn:microsoft.com/office/officeart/2005/8/layout/vList6"/>
     <dgm:cxn modelId="{D5C563B0-C163-4B55-A687-9817EA3CF5BA}" type="presOf" srcId="{B1F3B948-AEC3-4CD5-AAB8-CC52393C78D5}" destId="{5EE3DBB4-4FD8-420F-BB3C-3475EAFAAB39}" srcOrd="0" destOrd="0" presId="urn:microsoft.com/office/officeart/2005/8/layout/vList6"/>
@@ -3631,7 +3596,7 @@
         <a:p>
           <a:r>
             <a:rPr lang="en-US" sz="1400" dirty="0"/>
-            <a:t>Pet Dating: manage pet in dating club, update pet, book dating service..</a:t>
+            <a:t>Login – Pet-Dating: Login, manage pet in dating club, update pet, book dating service..</a:t>
           </a:r>
         </a:p>
       </dgm:t>
@@ -3666,12 +3631,8 @@
         <a:lstStyle/>
         <a:p>
           <a:r>
-            <a:rPr lang="en-US" sz="1400" dirty="0" err="1"/>
-            <a:t>Category+Shop</a:t>
-          </a:r>
-          <a:r>
             <a:rPr lang="en-US" sz="1400" dirty="0"/>
-            <a:t>: search, order, recommend product, manage product (insert, update, delete, …) </a:t>
+            <a:t>Category + Shop: search, order, recommend product, manage product (insert, update, delete, …) </a:t>
           </a:r>
         </a:p>
       </dgm:t>
@@ -3707,7 +3668,15 @@
         <a:p>
           <a:r>
             <a:rPr lang="en-US" sz="1400" dirty="0"/>
-            <a:t>Pet Service: Book services: grooming, hotel, care, manage Service (insert, update, delete)  </a:t>
+            <a:t>Register - Pet </a:t>
+          </a:r>
+          <a:r>
+            <a:rPr lang="en-US" sz="1400"/>
+            <a:t>Service: Register form, </a:t>
+          </a:r>
+          <a:r>
+            <a:rPr lang="en-US" sz="1400" dirty="0"/>
+            <a:t>Book services: grooming, hotel, care, manage Service (insert, update, delete)  </a:t>
           </a:r>
         </a:p>
       </dgm:t>
@@ -3784,7 +3753,7 @@
       <dgm:spPr/>
     </dgm:pt>
     <dgm:pt modelId="{5C422CA6-9A0B-4E53-ADC0-ABA98C13C7CD}" type="pres">
-      <dgm:prSet presAssocID="{FBBEC36F-FB7D-4962-ADE6-14810757DD0D}" presName="rect2" presStyleLbl="fgImgPlace1" presStyleIdx="1" presStyleCnt="3" custLinFactX="-86291" custLinFactNeighborX="-100000" custLinFactNeighborY="6258"/>
+      <dgm:prSet presAssocID="{FBBEC36F-FB7D-4962-ADE6-14810757DD0D}" presName="rect2" presStyleLbl="fgImgPlace1" presStyleIdx="1" presStyleCnt="3" custLinFactX="-86291" custLinFactNeighborX="-100000" custLinFactNeighborY="4074"/>
       <dgm:spPr>
         <a:blipFill>
           <a:blip xmlns:r="http://schemas.openxmlformats.org/officeDocument/2006/relationships" r:embed="rId2">
@@ -3875,7 +3844,7 @@
       </dsp:nvSpPr>
       <dsp:spPr>
         <a:xfrm>
-          <a:off x="2158311" y="4135755"/>
+          <a:off x="2200207" y="4135755"/>
           <a:ext cx="4322521" cy="0"/>
         </a:xfrm>
         <a:prstGeom prst="line">
@@ -3916,7 +3885,7 @@
       </dsp:nvSpPr>
       <dsp:spPr>
         <a:xfrm>
-          <a:off x="2158311" y="2628899"/>
+          <a:off x="2200207" y="2628899"/>
           <a:ext cx="3702558" cy="0"/>
         </a:xfrm>
         <a:prstGeom prst="line">
@@ -3957,7 +3926,7 @@
       </dsp:nvSpPr>
       <dsp:spPr>
         <a:xfrm>
-          <a:off x="2158311" y="1122044"/>
+          <a:off x="2200207" y="1122044"/>
           <a:ext cx="4322521" cy="0"/>
         </a:xfrm>
         <a:prstGeom prst="line">
@@ -3998,7 +3967,7 @@
       </dsp:nvSpPr>
       <dsp:spPr>
         <a:xfrm>
-          <a:off x="914381" y="914421"/>
+          <a:off x="956277" y="914421"/>
           <a:ext cx="3657610" cy="3505159"/>
         </a:xfrm>
         <a:prstGeom prst="ellipse">
@@ -4050,7 +4019,7 @@
       </dsp:nvSpPr>
       <dsp:spPr>
         <a:xfrm>
-          <a:off x="216407" y="2"/>
+          <a:off x="258303" y="2"/>
           <a:ext cx="1993388" cy="2133595"/>
         </a:xfrm>
         <a:prstGeom prst="rect">
@@ -4099,22 +4068,26 @@
           <a:r>
             <a:rPr lang="en-GB" sz="2000" b="1" kern="1200" dirty="0">
               <a:solidFill>
-                <a:srgbClr val="9F1D8C"/>
+                <a:schemeClr val="tx1"/>
               </a:solidFill>
-              <a:latin typeface="+mj-lt"/>
+              <a:latin typeface="Tahoma" panose="020B0604030504040204" pitchFamily="34" charset="0"/>
+              <a:ea typeface="Tahoma" panose="020B0604030504040204" pitchFamily="34" charset="0"/>
+              <a:cs typeface="Tahoma" panose="020B0604030504040204" pitchFamily="34" charset="0"/>
             </a:rPr>
             <a:t>Building a website to enter e-commerce market of Pet</a:t>
           </a:r>
           <a:endParaRPr lang="en-US" sz="2000" b="1" kern="1200" dirty="0">
             <a:solidFill>
-              <a:srgbClr val="9F1D8C"/>
+              <a:schemeClr val="tx1"/>
             </a:solidFill>
-            <a:latin typeface="+mj-lt"/>
+            <a:latin typeface="Tahoma" panose="020B0604030504040204" pitchFamily="34" charset="0"/>
+            <a:ea typeface="Tahoma" panose="020B0604030504040204" pitchFamily="34" charset="0"/>
+            <a:cs typeface="Tahoma" panose="020B0604030504040204" pitchFamily="34" charset="0"/>
           </a:endParaRPr>
         </a:p>
       </dsp:txBody>
       <dsp:txXfrm>
-        <a:off x="216407" y="2"/>
+        <a:off x="258303" y="2"/>
         <a:ext cx="1993388" cy="2133595"/>
       </dsp:txXfrm>
     </dsp:sp>
@@ -4125,7 +4098,7 @@
       </dsp:nvSpPr>
       <dsp:spPr>
         <a:xfrm>
-          <a:off x="5835037" y="476249"/>
+          <a:off x="5876933" y="476249"/>
           <a:ext cx="1291590" cy="1291590"/>
         </a:xfrm>
         <a:prstGeom prst="ellipse">
@@ -4177,8 +4150,8 @@
       </dsp:nvSpPr>
       <dsp:spPr>
         <a:xfrm>
-          <a:off x="7126627" y="476249"/>
-          <a:ext cx="1154466" cy="1291590"/>
+          <a:off x="7168523" y="476249"/>
+          <a:ext cx="1070674" cy="1291590"/>
         </a:xfrm>
         <a:prstGeom prst="rect">
           <a:avLst/>
@@ -4222,16 +4195,19 @@
           <a:r>
             <a:rPr lang="en-US" sz="2000" kern="1200" dirty="0">
               <a:solidFill>
-                <a:srgbClr val="9F1D8C"/>
+                <a:schemeClr val="tx1"/>
               </a:solidFill>
+              <a:latin typeface="Tahoma" panose="020B0604030504040204" pitchFamily="34" charset="0"/>
+              <a:ea typeface="Tahoma" panose="020B0604030504040204" pitchFamily="34" charset="0"/>
+              <a:cs typeface="Tahoma" panose="020B0604030504040204" pitchFamily="34" charset="0"/>
             </a:rPr>
             <a:t>Services</a:t>
           </a:r>
         </a:p>
       </dsp:txBody>
       <dsp:txXfrm>
-        <a:off x="7126627" y="476249"/>
-        <a:ext cx="1154466" cy="1291590"/>
+        <a:off x="7168523" y="476249"/>
+        <a:ext cx="1070674" cy="1291590"/>
       </dsp:txXfrm>
     </dsp:sp>
     <dsp:sp modelId="{B3B67DAC-5AE8-4246-889B-48F013A8A526}">
@@ -4241,7 +4217,7 @@
       </dsp:nvSpPr>
       <dsp:spPr>
         <a:xfrm>
-          <a:off x="5215074" y="1983104"/>
+          <a:off x="5256970" y="1983104"/>
           <a:ext cx="1291590" cy="1291590"/>
         </a:xfrm>
         <a:prstGeom prst="ellipse">
@@ -4293,8 +4269,8 @@
       </dsp:nvSpPr>
       <dsp:spPr>
         <a:xfrm>
-          <a:off x="6506664" y="1983104"/>
-          <a:ext cx="804283" cy="1291590"/>
+          <a:off x="6548560" y="1983104"/>
+          <a:ext cx="744951" cy="1291590"/>
         </a:xfrm>
         <a:prstGeom prst="rect">
           <a:avLst/>
@@ -4338,16 +4314,19 @@
           <a:r>
             <a:rPr lang="en-US" sz="2000" kern="1200" dirty="0">
               <a:solidFill>
-                <a:srgbClr val="9F1D8C"/>
+                <a:schemeClr val="tx1"/>
               </a:solidFill>
+              <a:latin typeface="Tahoma" panose="020B0604030504040204" pitchFamily="34" charset="0"/>
+              <a:ea typeface="Tahoma" panose="020B0604030504040204" pitchFamily="34" charset="0"/>
+              <a:cs typeface="Tahoma" panose="020B0604030504040204" pitchFamily="34" charset="0"/>
             </a:rPr>
             <a:t>Shop</a:t>
           </a:r>
         </a:p>
       </dsp:txBody>
       <dsp:txXfrm>
-        <a:off x="6506664" y="1983104"/>
-        <a:ext cx="804283" cy="1291590"/>
+        <a:off x="6548560" y="1983104"/>
+        <a:ext cx="744951" cy="1291590"/>
       </dsp:txXfrm>
     </dsp:sp>
     <dsp:sp modelId="{64AFD26C-CD2D-4BBF-A720-7116FFB8E3F9}">
@@ -4357,7 +4336,7 @@
       </dsp:nvSpPr>
       <dsp:spPr>
         <a:xfrm>
-          <a:off x="5835037" y="3489960"/>
+          <a:off x="5876933" y="3489960"/>
           <a:ext cx="1291590" cy="1291590"/>
         </a:xfrm>
         <a:prstGeom prst="ellipse">
@@ -4409,7 +4388,7 @@
       </dsp:nvSpPr>
       <dsp:spPr>
         <a:xfrm>
-          <a:off x="7126627" y="3489960"/>
+          <a:off x="7168523" y="3489960"/>
           <a:ext cx="903090" cy="1291590"/>
         </a:xfrm>
         <a:prstGeom prst="rect">
@@ -4454,15 +4433,18 @@
           <a:r>
             <a:rPr lang="en-US" sz="2000" kern="1200" dirty="0">
               <a:solidFill>
-                <a:srgbClr val="D119A1"/>
+                <a:schemeClr val="tx1"/>
               </a:solidFill>
+              <a:latin typeface="Tahoma" panose="020B0604030504040204" pitchFamily="34" charset="0"/>
+              <a:ea typeface="Tahoma" panose="020B0604030504040204" pitchFamily="34" charset="0"/>
+              <a:cs typeface="Tahoma" panose="020B0604030504040204" pitchFamily="34" charset="0"/>
             </a:rPr>
             <a:t>Pet Dating</a:t>
           </a:r>
         </a:p>
       </dsp:txBody>
       <dsp:txXfrm>
-        <a:off x="7126627" y="3489960"/>
+        <a:off x="7168523" y="3489960"/>
         <a:ext cx="903090" cy="1291590"/>
       </dsp:txXfrm>
     </dsp:sp>
@@ -4614,7 +4596,7 @@
               <a:latin typeface="Bahnschrift Light" panose="020B0502040204020203" pitchFamily="34" charset="0"/>
               <a:cs typeface="Angsana New" panose="02020603050405020304" pitchFamily="18" charset="-34"/>
             </a:rPr>
-            <a:t> IDE 7.4</a:t>
+            <a:t> IDE 8.2</a:t>
           </a:r>
           <a:endParaRPr lang="en-US" sz="1600" kern="1200" dirty="0">
             <a:latin typeface="Bahnschrift Light" panose="020B0502040204020203" pitchFamily="34" charset="0"/>
@@ -4647,7 +4629,7 @@
               <a:latin typeface="Bahnschrift Light" panose="020B0502040204020203" pitchFamily="34" charset="0"/>
               <a:cs typeface="Angsana New" panose="02020603050405020304" pitchFamily="18" charset="-34"/>
             </a:rPr>
-            <a:t> Server 4.0</a:t>
+            <a:t> Server 4.1</a:t>
           </a:r>
           <a:endParaRPr lang="en-US" sz="1600" kern="1200" dirty="0">
             <a:latin typeface="Bahnschrift Light" panose="020B0502040204020203" pitchFamily="34" charset="0"/>
@@ -4699,7 +4681,7 @@
               <a:latin typeface="Bahnschrift Light" panose="020B0502040204020203" pitchFamily="34" charset="0"/>
               <a:cs typeface="Angsana New" panose="02020603050405020304" pitchFamily="18" charset="-34"/>
             </a:rPr>
-            <a:t>Google Chrome 65.0</a:t>
+            <a:t>Google Chrome 74</a:t>
           </a:r>
           <a:endParaRPr lang="en-US" sz="1600" kern="1200" dirty="0">
             <a:latin typeface="Bahnschrift Light" panose="020B0502040204020203" pitchFamily="34" charset="0"/>
@@ -4805,7 +4787,7 @@
       </dsp:nvSpPr>
       <dsp:spPr>
         <a:xfrm>
-          <a:off x="2651760" y="2474658"/>
+          <a:off x="2651759" y="2475234"/>
           <a:ext cx="3977640" cy="2249165"/>
         </a:xfrm>
         <a:prstGeom prst="rightArrow">
@@ -4967,7 +4949,7 @@
             <a:buChar char=""/>
           </a:pPr>
           <a:r>
-            <a:rPr lang="en-GB" sz="1600" kern="1200">
+            <a:rPr lang="en-GB" sz="1600" kern="1200" dirty="0">
               <a:latin typeface="Bahnschrift Light" panose="020B0502040204020203" pitchFamily="34" charset="0"/>
             </a:rPr>
             <a:t>JavaScript</a:t>
@@ -4976,33 +4958,9 @@
             <a:latin typeface="Bahnschrift Light" panose="020B0502040204020203" pitchFamily="34" charset="0"/>
           </a:endParaRPr>
         </a:p>
-        <a:p>
-          <a:pPr marL="171450" lvl="1" indent="-171450" algn="l" defTabSz="711200">
-            <a:lnSpc>
-              <a:spcPct val="90000"/>
-            </a:lnSpc>
-            <a:spcBef>
-              <a:spcPct val="0"/>
-            </a:spcBef>
-            <a:spcAft>
-              <a:spcPct val="15000"/>
-            </a:spcAft>
-            <a:buFont typeface="Symbol" panose="05050102010706020507" pitchFamily="18" charset="2"/>
-            <a:buChar char=""/>
-          </a:pPr>
-          <a:r>
-            <a:rPr lang="en-GB" sz="1600" kern="1200" dirty="0">
-              <a:latin typeface="Bahnschrift Light" panose="020B0502040204020203" pitchFamily="34" charset="0"/>
-            </a:rPr>
-            <a:t>Apache Tiles Framework</a:t>
-          </a:r>
-          <a:endParaRPr lang="en-US" sz="1600" kern="1200" dirty="0">
-            <a:latin typeface="Bahnschrift Light" panose="020B0502040204020203" pitchFamily="34" charset="0"/>
-          </a:endParaRPr>
-        </a:p>
       </dsp:txBody>
       <dsp:txXfrm>
-        <a:off x="2651760" y="2755804"/>
+        <a:off x="2651759" y="2756380"/>
         <a:ext cx="3134203" cy="1686873"/>
       </dsp:txXfrm>
     </dsp:sp>
@@ -5171,7 +5129,7 @@
           </a:pPr>
           <a:r>
             <a:rPr lang="en-US" sz="1400" kern="1200" dirty="0"/>
-            <a:t>Pet Dating: manage pet in dating club, update pet, book dating service..</a:t>
+            <a:t>Login – Pet-Dating: Login, manage pet in dating club, update pet, book dating service..</a:t>
           </a:r>
         </a:p>
       </dsp:txBody>
@@ -5292,12 +5250,8 @@
             <a:buNone/>
           </a:pPr>
           <a:r>
-            <a:rPr lang="en-US" sz="1400" kern="1200" dirty="0" err="1"/>
-            <a:t>Category+Shop</a:t>
-          </a:r>
-          <a:r>
             <a:rPr lang="en-US" sz="1400" kern="1200" dirty="0"/>
-            <a:t>: search, order, recommend product, manage product (insert, update, delete, …) </a:t>
+            <a:t>Category + Shop: search, order, recommend product, manage product (insert, update, delete, …) </a:t>
           </a:r>
         </a:p>
       </dsp:txBody>
@@ -5313,7 +5267,7 @@
       </dsp:nvSpPr>
       <dsp:spPr>
         <a:xfrm>
-          <a:off x="152397" y="1936360"/>
+          <a:off x="152397" y="1905005"/>
           <a:ext cx="957088" cy="1435632"/>
         </a:xfrm>
         <a:prstGeom prst="rect">
@@ -5425,7 +5379,15 @@
           </a:pPr>
           <a:r>
             <a:rPr lang="en-US" sz="1400" kern="1200" dirty="0"/>
-            <a:t>Pet Service: Book services: grooming, hotel, care, manage Service (insert, update, delete)  </a:t>
+            <a:t>Register - Pet </a:t>
+          </a:r>
+          <a:r>
+            <a:rPr lang="en-US" sz="1400" kern="1200"/>
+            <a:t>Service: Register form, </a:t>
+          </a:r>
+          <a:r>
+            <a:rPr lang="en-US" sz="1400" kern="1200" dirty="0"/>
+            <a:t>Book services: grooming, hotel, care, manage Service (insert, update, delete)  </a:t>
           </a:r>
         </a:p>
       </dsp:txBody>
@@ -11742,7 +11704,7 @@
               <a:pPr>
                 <a:defRPr/>
               </a:pPr>
-              <a:t>12</a:t>
+              <a:t>11</a:t>
             </a:fld>
             <a:endParaRPr lang="en-US" dirty="0"/>
           </a:p>
@@ -13215,9 +13177,9 @@
                 <a:solidFill>
                   <a:srgbClr val="C00000"/>
                 </a:solidFill>
-                <a:latin typeface="Times New Roman" panose="02020603050405020304" pitchFamily="18" charset="0"/>
-                <a:ea typeface="Gulim" panose="020B0600000101010101" pitchFamily="34" charset="-127"/>
-                <a:cs typeface="Times New Roman" panose="02020603050405020304" pitchFamily="18" charset="0"/>
+                <a:latin typeface="Tahoma" panose="020B0604030504040204" pitchFamily="34" charset="0"/>
+                <a:ea typeface="Tahoma" panose="020B0604030504040204" pitchFamily="34" charset="0"/>
+                <a:cs typeface="Tahoma" panose="020B0604030504040204" pitchFamily="34" charset="0"/>
               </a:rPr>
               <a:t>PET PARADISE</a:t>
             </a:r>
@@ -13252,21 +13214,29 @@
                 <a:ea typeface="Gulim" panose="020B0600000101010101" pitchFamily="34" charset="-127"/>
                 <a:cs typeface="Times New Roman" panose="02020603050405020304" pitchFamily="18" charset="0"/>
               </a:rPr>
-              <a:t>  Le Cong </a:t>
+              <a:t>  </a:t>
             </a:r>
             <a:r>
-              <a:rPr lang="en-US" altLang="ko-KR" sz="2000" i="1" dirty="0" err="1">
-                <a:latin typeface="Times New Roman" panose="02020603050405020304" pitchFamily="18" charset="0"/>
-                <a:ea typeface="Gulim" panose="020B0600000101010101" pitchFamily="34" charset="-127"/>
-                <a:cs typeface="Times New Roman" panose="02020603050405020304" pitchFamily="18" charset="0"/>
+              <a:rPr lang="en-US" altLang="ko-KR" sz="2000" dirty="0">
+                <a:latin typeface="Tahoma" panose="020B0604030504040204" pitchFamily="34" charset="0"/>
+                <a:ea typeface="Tahoma" panose="020B0604030504040204" pitchFamily="34" charset="0"/>
+                <a:cs typeface="Tahoma" panose="020B0604030504040204" pitchFamily="34" charset="0"/>
+              </a:rPr>
+              <a:t>Le Cong </a:t>
+            </a:r>
+            <a:r>
+              <a:rPr lang="en-US" altLang="ko-KR" sz="2000" dirty="0" err="1">
+                <a:latin typeface="Tahoma" panose="020B0604030504040204" pitchFamily="34" charset="0"/>
+                <a:ea typeface="Tahoma" panose="020B0604030504040204" pitchFamily="34" charset="0"/>
+                <a:cs typeface="Tahoma" panose="020B0604030504040204" pitchFamily="34" charset="0"/>
               </a:rPr>
               <a:t>Dat</a:t>
             </a:r>
             <a:r>
-              <a:rPr lang="en-US" altLang="ko-KR" sz="2000" i="1" dirty="0">
-                <a:latin typeface="Times New Roman" panose="02020603050405020304" pitchFamily="18" charset="0"/>
-                <a:ea typeface="Gulim" panose="020B0600000101010101" pitchFamily="34" charset="-127"/>
-                <a:cs typeface="Times New Roman" panose="02020603050405020304" pitchFamily="18" charset="0"/>
+              <a:rPr lang="en-US" altLang="ko-KR" sz="2000" dirty="0">
+                <a:latin typeface="Tahoma" panose="020B0604030504040204" pitchFamily="34" charset="0"/>
+                <a:ea typeface="Tahoma" panose="020B0604030504040204" pitchFamily="34" charset="0"/>
+                <a:cs typeface="Tahoma" panose="020B0604030504040204" pitchFamily="34" charset="0"/>
               </a:rPr>
               <a:t> – Student1022144</a:t>
             </a:r>
@@ -13277,42 +13247,42 @@
               <a:buNone/>
             </a:pPr>
             <a:r>
-              <a:rPr lang="en-US" altLang="ko-KR" sz="2000" i="1" dirty="0">
-                <a:latin typeface="Times New Roman" panose="02020603050405020304" pitchFamily="18" charset="0"/>
-                <a:ea typeface="Gulim" panose="020B0600000101010101" pitchFamily="34" charset="-127"/>
-                <a:cs typeface="Times New Roman" panose="02020603050405020304" pitchFamily="18" charset="0"/>
+              <a:rPr lang="en-US" altLang="ko-KR" sz="2000" dirty="0">
+                <a:latin typeface="Tahoma" panose="020B0604030504040204" pitchFamily="34" charset="0"/>
+                <a:ea typeface="Tahoma" panose="020B0604030504040204" pitchFamily="34" charset="0"/>
+                <a:cs typeface="Tahoma" panose="020B0604030504040204" pitchFamily="34" charset="0"/>
               </a:rPr>
               <a:t>	  Tran </a:t>
             </a:r>
             <a:r>
-              <a:rPr lang="en-US" altLang="ko-KR" sz="2000" i="1" dirty="0" err="1">
-                <a:latin typeface="Times New Roman" panose="02020603050405020304" pitchFamily="18" charset="0"/>
-                <a:ea typeface="Gulim" panose="020B0600000101010101" pitchFamily="34" charset="-127"/>
-                <a:cs typeface="Times New Roman" panose="02020603050405020304" pitchFamily="18" charset="0"/>
+              <a:rPr lang="en-US" altLang="ko-KR" sz="2000" dirty="0" err="1">
+                <a:latin typeface="Tahoma" panose="020B0604030504040204" pitchFamily="34" charset="0"/>
+                <a:ea typeface="Tahoma" panose="020B0604030504040204" pitchFamily="34" charset="0"/>
+                <a:cs typeface="Tahoma" panose="020B0604030504040204" pitchFamily="34" charset="0"/>
               </a:rPr>
               <a:t>Thi</a:t>
             </a:r>
             <a:r>
-              <a:rPr lang="en-US" altLang="ko-KR" sz="2000" i="1" dirty="0">
-                <a:latin typeface="Times New Roman" panose="02020603050405020304" pitchFamily="18" charset="0"/>
-                <a:ea typeface="Gulim" panose="020B0600000101010101" pitchFamily="34" charset="-127"/>
-                <a:cs typeface="Times New Roman" panose="02020603050405020304" pitchFamily="18" charset="0"/>
+              <a:rPr lang="en-US" altLang="ko-KR" sz="2000" dirty="0">
+                <a:latin typeface="Tahoma" panose="020B0604030504040204" pitchFamily="34" charset="0"/>
+                <a:ea typeface="Tahoma" panose="020B0604030504040204" pitchFamily="34" charset="0"/>
+                <a:cs typeface="Tahoma" panose="020B0604030504040204" pitchFamily="34" charset="0"/>
               </a:rPr>
               <a:t> Tuyet </a:t>
             </a:r>
             <a:r>
-              <a:rPr lang="en-US" altLang="ko-KR" sz="2000" i="1" dirty="0" err="1">
-                <a:latin typeface="Times New Roman" panose="02020603050405020304" pitchFamily="18" charset="0"/>
-                <a:ea typeface="Gulim" panose="020B0600000101010101" pitchFamily="34" charset="-127"/>
-                <a:cs typeface="Times New Roman" panose="02020603050405020304" pitchFamily="18" charset="0"/>
+              <a:rPr lang="en-US" altLang="ko-KR" sz="2000" dirty="0" err="1">
+                <a:latin typeface="Tahoma" panose="020B0604030504040204" pitchFamily="34" charset="0"/>
+                <a:ea typeface="Tahoma" panose="020B0604030504040204" pitchFamily="34" charset="0"/>
+                <a:cs typeface="Tahoma" panose="020B0604030504040204" pitchFamily="34" charset="0"/>
               </a:rPr>
               <a:t>Duyen</a:t>
             </a:r>
             <a:r>
-              <a:rPr lang="en-US" altLang="ko-KR" sz="2000" i="1" dirty="0">
-                <a:latin typeface="Times New Roman" panose="02020603050405020304" pitchFamily="18" charset="0"/>
-                <a:ea typeface="Gulim" panose="020B0600000101010101" pitchFamily="34" charset="-127"/>
-                <a:cs typeface="Times New Roman" panose="02020603050405020304" pitchFamily="18" charset="0"/>
+              <a:rPr lang="en-US" altLang="ko-KR" sz="2000" dirty="0">
+                <a:latin typeface="Tahoma" panose="020B0604030504040204" pitchFamily="34" charset="0"/>
+                <a:ea typeface="Tahoma" panose="020B0604030504040204" pitchFamily="34" charset="0"/>
+                <a:cs typeface="Tahoma" panose="020B0604030504040204" pitchFamily="34" charset="0"/>
               </a:rPr>
               <a:t> – Student1030933 </a:t>
             </a:r>
@@ -13323,26 +13293,26 @@
               <a:buNone/>
             </a:pPr>
             <a:r>
-              <a:rPr lang="en-US" altLang="ko-KR" sz="2000" i="1" dirty="0">
-                <a:latin typeface="Times New Roman" panose="02020603050405020304" pitchFamily="18" charset="0"/>
-                <a:ea typeface="Gulim" panose="020B0600000101010101" pitchFamily="34" charset="-127"/>
-                <a:cs typeface="Times New Roman" panose="02020603050405020304" pitchFamily="18" charset="0"/>
+              <a:rPr lang="en-US" altLang="ko-KR" sz="2000" dirty="0">
+                <a:latin typeface="Tahoma" panose="020B0604030504040204" pitchFamily="34" charset="0"/>
+                <a:ea typeface="Tahoma" panose="020B0604030504040204" pitchFamily="34" charset="0"/>
+                <a:cs typeface="Tahoma" panose="020B0604030504040204" pitchFamily="34" charset="0"/>
               </a:rPr>
               <a:t>	  Tran Tan </a:t>
             </a:r>
             <a:r>
-              <a:rPr lang="en-US" altLang="ko-KR" sz="2000" i="1" dirty="0" err="1">
-                <a:latin typeface="Times New Roman" panose="02020603050405020304" pitchFamily="18" charset="0"/>
-                <a:ea typeface="Gulim" panose="020B0600000101010101" pitchFamily="34" charset="-127"/>
-                <a:cs typeface="Times New Roman" panose="02020603050405020304" pitchFamily="18" charset="0"/>
+              <a:rPr lang="en-US" altLang="ko-KR" sz="2000" dirty="0" err="1">
+                <a:latin typeface="Tahoma" panose="020B0604030504040204" pitchFamily="34" charset="0"/>
+                <a:ea typeface="Tahoma" panose="020B0604030504040204" pitchFamily="34" charset="0"/>
+                <a:cs typeface="Tahoma" panose="020B0604030504040204" pitchFamily="34" charset="0"/>
               </a:rPr>
               <a:t>Duy</a:t>
             </a:r>
             <a:r>
-              <a:rPr lang="en-US" altLang="ko-KR" sz="2000" i="1" dirty="0">
-                <a:latin typeface="Times New Roman" panose="02020603050405020304" pitchFamily="18" charset="0"/>
-                <a:ea typeface="Gulim" panose="020B0600000101010101" pitchFamily="34" charset="-127"/>
-                <a:cs typeface="Times New Roman" panose="02020603050405020304" pitchFamily="18" charset="0"/>
+              <a:rPr lang="en-US" altLang="ko-KR" sz="2000" dirty="0">
+                <a:latin typeface="Tahoma" panose="020B0604030504040204" pitchFamily="34" charset="0"/>
+                <a:ea typeface="Tahoma" panose="020B0604030504040204" pitchFamily="34" charset="0"/>
+                <a:cs typeface="Tahoma" panose="020B0604030504040204" pitchFamily="34" charset="0"/>
               </a:rPr>
               <a:t> – Student1053750</a:t>
             </a:r>
@@ -13376,15 +13346,16 @@
             </a:pPr>
             <a:r>
               <a:rPr lang="en-US" altLang="ko-KR" sz="1800" dirty="0">
-                <a:latin typeface="Times New Roman" panose="02020603050405020304" pitchFamily="18" charset="0"/>
-                <a:ea typeface="Gulim" panose="020B0600000101010101" pitchFamily="34" charset="-127"/>
-                <a:cs typeface="Times New Roman" panose="02020603050405020304" pitchFamily="18" charset="0"/>
+                <a:latin typeface="Tahoma" panose="020B0604030504040204" pitchFamily="34" charset="0"/>
+                <a:ea typeface="Tahoma" panose="020B0604030504040204" pitchFamily="34" charset="0"/>
+                <a:cs typeface="Tahoma" panose="020B0604030504040204" pitchFamily="34" charset="0"/>
               </a:rPr>
               <a:t>22 May 2019</a:t>
             </a:r>
             <a:endParaRPr lang="vi-VN" altLang="ko-KR" sz="1800" dirty="0">
-              <a:latin typeface="Times New Roman" panose="02020603050405020304" pitchFamily="18" charset="0"/>
-              <a:cs typeface="Times New Roman" panose="02020603050405020304" pitchFamily="18" charset="0"/>
+              <a:latin typeface="Tahoma" panose="020B0604030504040204" pitchFamily="34" charset="0"/>
+              <a:ea typeface="Tahoma" panose="020B0604030504040204" pitchFamily="34" charset="0"/>
+              <a:cs typeface="Tahoma" panose="020B0604030504040204" pitchFamily="34" charset="0"/>
             </a:endParaRPr>
           </a:p>
           <a:p>
@@ -13503,8 +13474,8 @@
         </p:blipFill>
         <p:spPr>
           <a:xfrm>
-            <a:off x="2286000" y="3733800"/>
-            <a:ext cx="5088901" cy="2713418"/>
+            <a:off x="3048000" y="4800600"/>
+            <a:ext cx="3200400" cy="1706463"/>
           </a:xfrm>
         </p:spPr>
       </p:pic>
@@ -13548,56 +13519,130 @@
           </a:p>
         </p:txBody>
       </p:sp>
-      <p:sp>
-        <p:nvSpPr>
-          <p:cNvPr id="6" name="TextBox 5">
+      <p:graphicFrame>
+        <p:nvGraphicFramePr>
+          <p:cNvPr id="2" name="Table 1">
             <a:extLst>
               <a:ext uri="{FF2B5EF4-FFF2-40B4-BE49-F238E27FC236}">
-                <a16:creationId xmlns:a16="http://schemas.microsoft.com/office/drawing/2014/main" id="{86A5494B-CCD3-410A-9D0B-78D0D2E03588}"/>
+                <a16:creationId xmlns:a16="http://schemas.microsoft.com/office/drawing/2014/main" id="{C2818EDC-EE7A-46C4-91A3-8CDD0FBBF274}"/>
               </a:ext>
             </a:extLst>
           </p:cNvPr>
-          <p:cNvSpPr txBox="1"/>
-          <p:nvPr/>
-        </p:nvSpPr>
-        <p:spPr>
-          <a:xfrm>
-            <a:off x="609600" y="1066800"/>
-            <a:ext cx="8077200" cy="2423740"/>
-          </a:xfrm>
-          <a:prstGeom prst="rect">
-            <a:avLst/>
-          </a:prstGeom>
-          <a:noFill/>
-        </p:spPr>
-        <p:txBody>
-          <a:bodyPr wrap="square" rtlCol="0">
-            <a:spAutoFit/>
-          </a:bodyPr>
-          <a:lstStyle/>
-          <a:p>
-            <a:pPr algn="just"/>
-            <a:r>
-              <a:rPr lang="en-GB" sz="2000" dirty="0">
-                <a:latin typeface="+mj-lt"/>
-              </a:rPr>
-              <a:t>People Who willing pay lots of money for their pet but they have no much time to shopping directly at store easily realize that the e-commerce market is growing rapidly, easily approaching the right customers</a:t>
-            </a:r>
-          </a:p>
-          <a:p>
-            <a:pPr algn="just"/>
-            <a:r>
-              <a:rPr lang="en-GB" sz="2000" dirty="0">
-                <a:latin typeface="+mj-lt"/>
-              </a:rPr>
-              <a:t>This e-commerce website will help people save time and minimize carrying cash when shopping, also helps reduce the risk of robbery when traffic is circulated, while reducing the rate of social evils also helps to build and develop the country. </a:t>
-            </a:r>
-            <a:endParaRPr lang="en-US" sz="2000" dirty="0">
-              <a:latin typeface="+mj-lt"/>
-            </a:endParaRPr>
-          </a:p>
-        </p:txBody>
-      </p:sp>
+          <p:cNvGraphicFramePr>
+            <a:graphicFrameLocks noGrp="1"/>
+          </p:cNvGraphicFramePr>
+          <p:nvPr>
+            <p:extLst>
+              <p:ext uri="{D42A27DB-BD31-4B8C-83A1-F6EECF244321}">
+                <p14:modId xmlns:p14="http://schemas.microsoft.com/office/powerpoint/2010/main" val="408874617"/>
+              </p:ext>
+            </p:extLst>
+          </p:nvPr>
+        </p:nvGraphicFramePr>
+        <p:xfrm>
+          <a:off x="1524000" y="1397000"/>
+          <a:ext cx="6096000" cy="1010920"/>
+        </p:xfrm>
+        <a:graphic>
+          <a:graphicData uri="http://schemas.openxmlformats.org/drawingml/2006/table">
+            <a:tbl>
+              <a:tblPr firstRow="1" bandRow="1">
+                <a:tableStyleId>{5C22544A-7EE6-4342-B048-85BDC9FD1C3A}</a:tableStyleId>
+              </a:tblPr>
+              <a:tblGrid>
+                <a:gridCol w="3048000">
+                  <a:extLst>
+                    <a:ext uri="{9D8B030D-6E8A-4147-A177-3AD203B41FA5}">
+                      <a16:colId xmlns:a16="http://schemas.microsoft.com/office/drawing/2014/main" val="3840055694"/>
+                    </a:ext>
+                  </a:extLst>
+                </a:gridCol>
+                <a:gridCol w="3048000">
+                  <a:extLst>
+                    <a:ext uri="{9D8B030D-6E8A-4147-A177-3AD203B41FA5}">
+                      <a16:colId xmlns:a16="http://schemas.microsoft.com/office/drawing/2014/main" val="1093561303"/>
+                    </a:ext>
+                  </a:extLst>
+                </a:gridCol>
+              </a:tblGrid>
+              <a:tr h="370840">
+                <a:tc>
+                  <a:txBody>
+                    <a:bodyPr/>
+                    <a:lstStyle/>
+                    <a:p>
+                      <a:r>
+                        <a:rPr lang="en-US" dirty="0"/>
+                        <a:t>Content Completed</a:t>
+                      </a:r>
+                    </a:p>
+                  </a:txBody>
+                  <a:tcPr/>
+                </a:tc>
+                <a:tc>
+                  <a:txBody>
+                    <a:bodyPr/>
+                    <a:lstStyle/>
+                    <a:p>
+                      <a:r>
+                        <a:rPr lang="en-US" dirty="0"/>
+                        <a:t>Future Development</a:t>
+                      </a:r>
+                    </a:p>
+                  </a:txBody>
+                  <a:tcPr/>
+                </a:tc>
+                <a:extLst>
+                  <a:ext uri="{0D108BD9-81ED-4DB2-BD59-A6C34878D82A}">
+                    <a16:rowId xmlns:a16="http://schemas.microsoft.com/office/drawing/2014/main" val="3811048649"/>
+                  </a:ext>
+                </a:extLst>
+              </a:tr>
+              <a:tr h="370840">
+                <a:tc>
+                  <a:txBody>
+                    <a:bodyPr/>
+                    <a:lstStyle/>
+                    <a:p>
+                      <a:endParaRPr lang="en-US" dirty="0"/>
+                    </a:p>
+                  </a:txBody>
+                  <a:tcPr/>
+                </a:tc>
+                <a:tc>
+                  <a:txBody>
+                    <a:bodyPr/>
+                    <a:lstStyle/>
+                    <a:p>
+                      <a:pPr marL="285750" indent="-285750">
+                        <a:buFontTx/>
+                        <a:buChar char="-"/>
+                      </a:pPr>
+                      <a:r>
+                        <a:rPr lang="en-US" dirty="0"/>
+                        <a:t>Payment (ATM, Visa)</a:t>
+                      </a:r>
+                    </a:p>
+                    <a:p>
+                      <a:pPr marL="285750" indent="-285750">
+                        <a:buFontTx/>
+                        <a:buChar char="-"/>
+                      </a:pPr>
+                      <a:endParaRPr lang="en-US" dirty="0"/>
+                    </a:p>
+                  </a:txBody>
+                  <a:tcPr/>
+                </a:tc>
+                <a:extLst>
+                  <a:ext uri="{0D108BD9-81ED-4DB2-BD59-A6C34878D82A}">
+                    <a16:rowId xmlns:a16="http://schemas.microsoft.com/office/drawing/2014/main" val="3653823128"/>
+                  </a:ext>
+                </a:extLst>
+              </a:tr>
+            </a:tbl>
+          </a:graphicData>
+        </a:graphic>
+      </p:graphicFrame>
     </p:spTree>
     <p:extLst>
       <p:ext uri="{BB962C8B-B14F-4D97-AF65-F5344CB8AC3E}">
@@ -13676,25 +13721,37 @@
           </a:p>
         </p:txBody>
       </p:sp>
-      <p:sp>
-        <p:nvSpPr>
-          <p:cNvPr id="4" name="Content Placeholder 3"/>
-          <p:cNvSpPr>
-            <a:spLocks noGrp="1"/>
-          </p:cNvSpPr>
+      <p:graphicFrame>
+        <p:nvGraphicFramePr>
+          <p:cNvPr id="2" name="Content Placeholder 1">
+            <a:extLst>
+              <a:ext uri="{FF2B5EF4-FFF2-40B4-BE49-F238E27FC236}">
+                <a16:creationId xmlns:a16="http://schemas.microsoft.com/office/drawing/2014/main" id="{64EE2ECC-8396-4D87-BAFD-AB0B773A8418}"/>
+              </a:ext>
+            </a:extLst>
+          </p:cNvPr>
+          <p:cNvGraphicFramePr>
+            <a:graphicFrameLocks noGrp="1"/>
+          </p:cNvGraphicFramePr>
           <p:nvPr>
             <p:ph idx="1"/>
+            <p:extLst>
+              <p:ext uri="{D42A27DB-BD31-4B8C-83A1-F6EECF244321}">
+                <p14:modId xmlns:p14="http://schemas.microsoft.com/office/powerpoint/2010/main" val="43950479"/>
+              </p:ext>
+            </p:extLst>
           </p:nvPr>
-        </p:nvSpPr>
-        <p:spPr/>
-        <p:txBody>
-          <a:bodyPr/>
-          <a:lstStyle/>
-          <a:p>
-            <a:endParaRPr lang="en-US" dirty="0"/>
-          </a:p>
-        </p:txBody>
-      </p:sp>
+        </p:nvGraphicFramePr>
+        <p:xfrm>
+          <a:off x="304800" y="914400"/>
+          <a:ext cx="8610600" cy="5257800"/>
+        </p:xfrm>
+        <a:graphic>
+          <a:graphicData uri="http://schemas.openxmlformats.org/drawingml/2006/diagram">
+            <dgm:relIds xmlns:dgm="http://schemas.openxmlformats.org/drawingml/2006/diagram" xmlns:r="http://schemas.openxmlformats.org/officeDocument/2006/relationships" r:dm="rId3" r:lo="rId4" r:qs="rId5" r:cs="rId6"/>
+          </a:graphicData>
+        </a:graphic>
+      </p:graphicFrame>
       <p:sp>
         <p:nvSpPr>
           <p:cNvPr id="8" name="Title 1"/>
@@ -13717,20 +13774,11 @@
           <a:p>
             <a:pPr lvl="1" algn="ctr"/>
             <a:r>
-              <a:rPr lang="en-US" altLang="en-US" sz="2800" dirty="0">
+              <a:rPr lang="en-US" altLang="en-US" sz="3200" dirty="0">
                 <a:latin typeface="Times New Roman" panose="02020603050405020304" pitchFamily="18" charset="0"/>
-                <a:ea typeface="Gulim" panose="020B0600000101010101" pitchFamily="34" charset="-127"/>
                 <a:cs typeface="Times New Roman" panose="02020603050405020304" pitchFamily="18" charset="0"/>
               </a:rPr>
-              <a:t>    	</a:t>
-            </a:r>
-            <a:r>
-              <a:rPr lang="en-US" altLang="ko-KR" sz="3200" dirty="0">
-                <a:latin typeface="Times New Roman" panose="02020603050405020304" pitchFamily="18" charset="0"/>
-                <a:ea typeface="Gulim" panose="020B0600000101010101" pitchFamily="34" charset="-127"/>
-                <a:cs typeface="Times New Roman" panose="02020603050405020304" pitchFamily="18" charset="0"/>
-              </a:rPr>
-              <a:t> Development</a:t>
+              <a:t>Task List</a:t>
             </a:r>
             <a:endParaRPr lang="en-US" altLang="en-US" sz="3200" dirty="0">
               <a:latin typeface="Times New Roman" panose="02020603050405020304" pitchFamily="18" charset="0"/>
@@ -13743,7 +13791,7 @@
     </p:spTree>
     <p:extLst>
       <p:ext uri="{BB962C8B-B14F-4D97-AF65-F5344CB8AC3E}">
-        <p14:creationId xmlns:p14="http://schemas.microsoft.com/office/powerpoint/2010/main" val="1751298595"/>
+        <p14:creationId xmlns:p14="http://schemas.microsoft.com/office/powerpoint/2010/main" val="2834231307"/>
       </p:ext>
     </p:extLst>
   </p:cSld>
@@ -13813,151 +13861,6 @@
                 <a:defRPr/>
               </a:pPr>
               <a:t>12</a:t>
-            </a:fld>
-            <a:endParaRPr lang="en-US" dirty="0"/>
-          </a:p>
-        </p:txBody>
-      </p:sp>
-      <p:graphicFrame>
-        <p:nvGraphicFramePr>
-          <p:cNvPr id="2" name="Content Placeholder 1">
-            <a:extLst>
-              <a:ext uri="{FF2B5EF4-FFF2-40B4-BE49-F238E27FC236}">
-                <a16:creationId xmlns:a16="http://schemas.microsoft.com/office/drawing/2014/main" id="{64EE2ECC-8396-4D87-BAFD-AB0B773A8418}"/>
-              </a:ext>
-            </a:extLst>
-          </p:cNvPr>
-          <p:cNvGraphicFramePr>
-            <a:graphicFrameLocks noGrp="1"/>
-          </p:cNvGraphicFramePr>
-          <p:nvPr>
-            <p:ph idx="1"/>
-            <p:extLst>
-              <p:ext uri="{D42A27DB-BD31-4B8C-83A1-F6EECF244321}">
-                <p14:modId xmlns:p14="http://schemas.microsoft.com/office/powerpoint/2010/main" val="326340194"/>
-              </p:ext>
-            </p:extLst>
-          </p:nvPr>
-        </p:nvGraphicFramePr>
-        <p:xfrm>
-          <a:off x="304800" y="914400"/>
-          <a:ext cx="8610600" cy="5257800"/>
-        </p:xfrm>
-        <a:graphic>
-          <a:graphicData uri="http://schemas.openxmlformats.org/drawingml/2006/diagram">
-            <dgm:relIds xmlns:dgm="http://schemas.openxmlformats.org/drawingml/2006/diagram" xmlns:r="http://schemas.openxmlformats.org/officeDocument/2006/relationships" r:dm="rId3" r:lo="rId4" r:qs="rId5" r:cs="rId6"/>
-          </a:graphicData>
-        </a:graphic>
-      </p:graphicFrame>
-      <p:sp>
-        <p:nvSpPr>
-          <p:cNvPr id="8" name="Title 1"/>
-          <p:cNvSpPr>
-            <a:spLocks noGrp="1"/>
-          </p:cNvSpPr>
-          <p:nvPr>
-            <p:ph type="title"/>
-          </p:nvPr>
-        </p:nvSpPr>
-        <p:spPr>
-          <a:xfrm>
-            <a:off x="304800" y="76200"/>
-            <a:ext cx="8610600" cy="609600"/>
-          </a:xfrm>
-        </p:spPr>
-        <p:txBody>
-          <a:bodyPr/>
-          <a:lstStyle/>
-          <a:p>
-            <a:pPr lvl="1" algn="ctr"/>
-            <a:r>
-              <a:rPr lang="en-US" altLang="en-US" sz="3200" dirty="0">
-                <a:latin typeface="Times New Roman" panose="02020603050405020304" pitchFamily="18" charset="0"/>
-                <a:cs typeface="Times New Roman" panose="02020603050405020304" pitchFamily="18" charset="0"/>
-              </a:rPr>
-              <a:t>Task List</a:t>
-            </a:r>
-            <a:endParaRPr lang="en-US" altLang="en-US" sz="3200" dirty="0">
-              <a:latin typeface="Times New Roman" panose="02020603050405020304" pitchFamily="18" charset="0"/>
-              <a:ea typeface="Gulim" panose="020B0600000101010101" pitchFamily="34" charset="-127"/>
-              <a:cs typeface="Times New Roman" panose="02020603050405020304" pitchFamily="18" charset="0"/>
-            </a:endParaRPr>
-          </a:p>
-        </p:txBody>
-      </p:sp>
-    </p:spTree>
-    <p:extLst>
-      <p:ext uri="{BB962C8B-B14F-4D97-AF65-F5344CB8AC3E}">
-        <p14:creationId xmlns:p14="http://schemas.microsoft.com/office/powerpoint/2010/main" val="2834231307"/>
-      </p:ext>
-    </p:extLst>
-  </p:cSld>
-  <p:clrMapOvr>
-    <a:masterClrMapping/>
-  </p:clrMapOvr>
-</p:sld>
-</file>
-
-<file path=ppt/slides/slide13.xml><?xml version="1.0" encoding="utf-8"?>
-<p:sld xmlns:a="http://schemas.openxmlformats.org/drawingml/2006/main" xmlns:r="http://schemas.openxmlformats.org/officeDocument/2006/relationships" xmlns:p="http://schemas.openxmlformats.org/presentationml/2006/main">
-  <p:cSld>
-    <p:bg>
-      <p:bgPr>
-        <a:gradFill>
-          <a:gsLst>
-            <a:gs pos="0">
-              <a:srgbClr val="FFEFD1"/>
-            </a:gs>
-            <a:gs pos="64999">
-              <a:srgbClr val="F0EBD5"/>
-            </a:gs>
-            <a:gs pos="100000">
-              <a:srgbClr val="D1C39F"/>
-            </a:gs>
-          </a:gsLst>
-          <a:lin ang="5400000" scaled="0"/>
-        </a:gradFill>
-        <a:effectLst/>
-      </p:bgPr>
-    </p:bg>
-    <p:spTree>
-      <p:nvGrpSpPr>
-        <p:cNvPr id="1" name=""/>
-        <p:cNvGrpSpPr/>
-        <p:nvPr/>
-      </p:nvGrpSpPr>
-      <p:grpSpPr>
-        <a:xfrm>
-          <a:off x="0" y="0"/>
-          <a:ext cx="0" cy="0"/>
-          <a:chOff x="0" y="0"/>
-          <a:chExt cx="0" cy="0"/>
-        </a:xfrm>
-      </p:grpSpPr>
-      <p:sp>
-        <p:nvSpPr>
-          <p:cNvPr id="5" name="Slide Number Placeholder 4"/>
-          <p:cNvSpPr>
-            <a:spLocks noGrp="1"/>
-          </p:cNvSpPr>
-          <p:nvPr>
-            <p:ph type="sldNum" sz="quarter" idx="4"/>
-          </p:nvPr>
-        </p:nvSpPr>
-        <p:spPr/>
-        <p:txBody>
-          <a:bodyPr/>
-          <a:lstStyle/>
-          <a:p>
-            <a:pPr>
-              <a:defRPr/>
-            </a:pPr>
-            <a:fld id="{0B7F2F63-BF3E-4C0C-A868-2C657446BA07}" type="slidenum">
-              <a:rPr lang="en-US" smtClean="0"/>
-              <a:pPr>
-                <a:defRPr/>
-              </a:pPr>
-              <a:t>13</a:t>
             </a:fld>
             <a:endParaRPr lang="en-US" dirty="0"/>
           </a:p>
@@ -14059,7 +13962,7 @@
 </p:sld>
 </file>
 
-<file path=ppt/slides/slide14.xml><?xml version="1.0" encoding="utf-8"?>
+<file path=ppt/slides/slide13.xml><?xml version="1.0" encoding="utf-8"?>
 <p:sld xmlns:a="http://schemas.openxmlformats.org/drawingml/2006/main" xmlns:r="http://schemas.openxmlformats.org/officeDocument/2006/relationships" xmlns:p="http://schemas.openxmlformats.org/presentationml/2006/main">
   <p:cSld>
     <p:bg>
@@ -14118,7 +14021,7 @@
               <a:pPr>
                 <a:defRPr/>
               </a:pPr>
-              <a:t>14</a:t>
+              <a:t>13</a:t>
             </a:fld>
             <a:endParaRPr lang="en-US" dirty="0"/>
           </a:p>
@@ -14144,12 +14047,103 @@
           <a:bodyPr/>
           <a:lstStyle/>
           <a:p>
-            <a:pPr eaLnBrk="1" hangingPunct="1">
+            <a:pPr>
               <a:defRPr/>
             </a:pPr>
-            <a:endParaRPr lang="en-US" dirty="0">
-              <a:latin typeface="Times New Roman" panose="02020603050405020304" pitchFamily="18" charset="0"/>
-              <a:cs typeface="Times New Roman" panose="02020603050405020304" pitchFamily="18" charset="0"/>
+            <a:r>
+              <a:rPr lang="en-US" sz="2000" i="1" dirty="0">
+                <a:latin typeface="Tahoma" panose="020B0604030504040204" pitchFamily="34" charset="0"/>
+                <a:ea typeface="Tahoma" panose="020B0604030504040204" pitchFamily="34" charset="0"/>
+                <a:cs typeface="Tahoma" panose="020B0604030504040204" pitchFamily="34" charset="0"/>
+                <a:hlinkClick r:id="rId2">
+                  <a:extLst>
+                    <a:ext uri="{A12FA001-AC4F-418D-AE19-62706E023703}">
+                      <ahyp:hlinkClr xmlns:ahyp="http://schemas.microsoft.com/office/drawing/2018/hyperlinkcolor" val="tx"/>
+                    </a:ext>
+                  </a:extLst>
+                </a:hlinkClick>
+              </a:rPr>
+              <a:t>https://www.w3schools.com/</a:t>
+            </a:r>
+            <a:endParaRPr lang="en-US" sz="2000" i="1" dirty="0">
+              <a:latin typeface="Tahoma" panose="020B0604030504040204" pitchFamily="34" charset="0"/>
+              <a:ea typeface="Tahoma" panose="020B0604030504040204" pitchFamily="34" charset="0"/>
+              <a:cs typeface="Tahoma" panose="020B0604030504040204" pitchFamily="34" charset="0"/>
+            </a:endParaRPr>
+          </a:p>
+          <a:p>
+            <a:pPr>
+              <a:defRPr/>
+            </a:pPr>
+            <a:r>
+              <a:rPr lang="en-US" sz="2000" i="1" dirty="0">
+                <a:latin typeface="Tahoma" panose="020B0604030504040204" pitchFamily="34" charset="0"/>
+                <a:ea typeface="Tahoma" panose="020B0604030504040204" pitchFamily="34" charset="0"/>
+                <a:cs typeface="Tahoma" panose="020B0604030504040204" pitchFamily="34" charset="0"/>
+                <a:hlinkClick r:id="rId3">
+                  <a:extLst>
+                    <a:ext uri="{A12FA001-AC4F-418D-AE19-62706E023703}">
+                      <ahyp:hlinkClr xmlns:ahyp="http://schemas.microsoft.com/office/drawing/2018/hyperlinkcolor" val="tx"/>
+                    </a:ext>
+                  </a:extLst>
+                </a:hlinkClick>
+              </a:rPr>
+              <a:t>https://angular.io/</a:t>
+            </a:r>
+            <a:endParaRPr lang="en-US" sz="2000" i="1" dirty="0">
+              <a:latin typeface="Tahoma" panose="020B0604030504040204" pitchFamily="34" charset="0"/>
+              <a:ea typeface="Tahoma" panose="020B0604030504040204" pitchFamily="34" charset="0"/>
+              <a:cs typeface="Tahoma" panose="020B0604030504040204" pitchFamily="34" charset="0"/>
+            </a:endParaRPr>
+          </a:p>
+          <a:p>
+            <a:pPr>
+              <a:defRPr/>
+            </a:pPr>
+            <a:r>
+              <a:rPr lang="en-US" sz="2000" i="1" dirty="0">
+                <a:latin typeface="Tahoma" panose="020B0604030504040204" pitchFamily="34" charset="0"/>
+                <a:ea typeface="Tahoma" panose="020B0604030504040204" pitchFamily="34" charset="0"/>
+                <a:cs typeface="Tahoma" panose="020B0604030504040204" pitchFamily="34" charset="0"/>
+                <a:hlinkClick r:id="rId4">
+                  <a:extLst>
+                    <a:ext uri="{A12FA001-AC4F-418D-AE19-62706E023703}">
+                      <ahyp:hlinkClr xmlns:ahyp="http://schemas.microsoft.com/office/drawing/2018/hyperlinkcolor" val="tx"/>
+                    </a:ext>
+                  </a:extLst>
+                </a:hlinkClick>
+              </a:rPr>
+              <a:t>https://getbootstrap.com/</a:t>
+            </a:r>
+            <a:endParaRPr lang="en-US" sz="2000" i="1" dirty="0">
+              <a:latin typeface="Tahoma" panose="020B0604030504040204" pitchFamily="34" charset="0"/>
+              <a:ea typeface="Tahoma" panose="020B0604030504040204" pitchFamily="34" charset="0"/>
+              <a:cs typeface="Tahoma" panose="020B0604030504040204" pitchFamily="34" charset="0"/>
+            </a:endParaRPr>
+          </a:p>
+          <a:p>
+            <a:pPr>
+              <a:defRPr/>
+            </a:pPr>
+            <a:r>
+              <a:rPr lang="en-US" sz="2000" i="1" dirty="0">
+                <a:latin typeface="Tahoma" panose="020B0604030504040204" pitchFamily="34" charset="0"/>
+                <a:ea typeface="Tahoma" panose="020B0604030504040204" pitchFamily="34" charset="0"/>
+                <a:cs typeface="Tahoma" panose="020B0604030504040204" pitchFamily="34" charset="0"/>
+                <a:hlinkClick r:id="rId5">
+                  <a:extLst>
+                    <a:ext uri="{A12FA001-AC4F-418D-AE19-62706E023703}">
+                      <ahyp:hlinkClr xmlns:ahyp="http://schemas.microsoft.com/office/drawing/2018/hyperlinkcolor" val="tx"/>
+                    </a:ext>
+                  </a:extLst>
+                </a:hlinkClick>
+              </a:rPr>
+              <a:t>https://www.youtube.com/?gl=VN</a:t>
+            </a:r>
+            <a:endParaRPr lang="en-US" sz="2000" i="1" dirty="0">
+              <a:latin typeface="Tahoma" panose="020B0604030504040204" pitchFamily="34" charset="0"/>
+              <a:ea typeface="Tahoma" panose="020B0604030504040204" pitchFamily="34" charset="0"/>
+              <a:cs typeface="Tahoma" panose="020B0604030504040204" pitchFamily="34" charset="0"/>
             </a:endParaRPr>
           </a:p>
         </p:txBody>
@@ -14319,9 +14313,9 @@
             <a:pPr eaLnBrk="1" hangingPunct="1"/>
             <a:r>
               <a:rPr lang="en-US" altLang="ko-KR" sz="2800" dirty="0">
-                <a:latin typeface="Times New Roman" panose="02020603050405020304" pitchFamily="18" charset="0"/>
-                <a:ea typeface="Gulim" panose="020B0600000101010101" pitchFamily="34" charset="-127"/>
-                <a:cs typeface="Times New Roman" panose="02020603050405020304" pitchFamily="18" charset="0"/>
+                <a:latin typeface="Tahoma" panose="020B0604030504040204" pitchFamily="34" charset="0"/>
+                <a:ea typeface="Tahoma" panose="020B0604030504040204" pitchFamily="34" charset="0"/>
+                <a:cs typeface="Tahoma" panose="020B0604030504040204" pitchFamily="34" charset="0"/>
               </a:rPr>
               <a:t>Introduction</a:t>
             </a:r>
@@ -14329,77 +14323,92 @@
           <a:p>
             <a:pPr lvl="1" eaLnBrk="1" hangingPunct="1"/>
             <a:r>
-              <a:rPr lang="en-US" altLang="en-US" sz="2800" i="1" dirty="0">
-                <a:latin typeface="Times New Roman" panose="02020603050405020304" pitchFamily="18" charset="0"/>
-                <a:ea typeface="Gulim" panose="020B0600000101010101" pitchFamily="34" charset="-127"/>
-                <a:cs typeface="Times New Roman" panose="02020603050405020304" pitchFamily="18" charset="0"/>
+              <a:rPr lang="en-US" altLang="en-US" sz="2400" dirty="0">
+                <a:latin typeface="Tahoma" panose="020B0604030504040204" pitchFamily="34" charset="0"/>
+                <a:ea typeface="Tahoma" panose="020B0604030504040204" pitchFamily="34" charset="0"/>
+                <a:cs typeface="Tahoma" panose="020B0604030504040204" pitchFamily="34" charset="0"/>
               </a:rPr>
               <a:t>Actual requirements</a:t>
             </a:r>
-            <a:endParaRPr lang="en-US" altLang="ko-KR" sz="2800" i="1" dirty="0">
-              <a:latin typeface="Times New Roman" panose="02020603050405020304" pitchFamily="18" charset="0"/>
-              <a:ea typeface="Gulim" panose="020B0600000101010101" pitchFamily="34" charset="-127"/>
-              <a:cs typeface="Times New Roman" panose="02020603050405020304" pitchFamily="18" charset="0"/>
+            <a:endParaRPr lang="en-US" altLang="ko-KR" sz="2400" dirty="0">
+              <a:latin typeface="Tahoma" panose="020B0604030504040204" pitchFamily="34" charset="0"/>
+              <a:ea typeface="Tahoma" panose="020B0604030504040204" pitchFamily="34" charset="0"/>
+              <a:cs typeface="Tahoma" panose="020B0604030504040204" pitchFamily="34" charset="0"/>
             </a:endParaRPr>
           </a:p>
           <a:p>
             <a:pPr lvl="1"/>
             <a:r>
-              <a:rPr lang="en-US" sz="2800" i="1" dirty="0">
-                <a:latin typeface="Times New Roman" panose="02020603050405020304" pitchFamily="18" charset="0"/>
-                <a:cs typeface="Times New Roman" panose="02020603050405020304" pitchFamily="18" charset="0"/>
+              <a:rPr lang="en-US" sz="2400" dirty="0">
+                <a:latin typeface="Tahoma" panose="020B0604030504040204" pitchFamily="34" charset="0"/>
+                <a:ea typeface="Tahoma" panose="020B0604030504040204" pitchFamily="34" charset="0"/>
+                <a:cs typeface="Tahoma" panose="020B0604030504040204" pitchFamily="34" charset="0"/>
               </a:rPr>
               <a:t>Requirements of the project</a:t>
             </a:r>
-            <a:endParaRPr lang="en-US" altLang="ko-KR" sz="2800" i="1" dirty="0">
-              <a:latin typeface="Times New Roman" panose="02020603050405020304" pitchFamily="18" charset="0"/>
-              <a:ea typeface="Gulim" panose="020B0600000101010101" pitchFamily="34" charset="-127"/>
-              <a:cs typeface="Times New Roman" panose="02020603050405020304" pitchFamily="18" charset="0"/>
+            <a:endParaRPr lang="en-US" altLang="ko-KR" sz="2400" dirty="0">
+              <a:latin typeface="Tahoma" panose="020B0604030504040204" pitchFamily="34" charset="0"/>
+              <a:ea typeface="Tahoma" panose="020B0604030504040204" pitchFamily="34" charset="0"/>
+              <a:cs typeface="Tahoma" panose="020B0604030504040204" pitchFamily="34" charset="0"/>
             </a:endParaRPr>
           </a:p>
           <a:p>
             <a:pPr lvl="1"/>
             <a:r>
-              <a:rPr lang="en-US" sz="2800" i="1" dirty="0">
-                <a:latin typeface="Times New Roman" panose="02020603050405020304" pitchFamily="18" charset="0"/>
-                <a:cs typeface="Times New Roman" panose="02020603050405020304" pitchFamily="18" charset="0"/>
+              <a:rPr lang="en-US" sz="2400" dirty="0">
+                <a:latin typeface="Tahoma" panose="020B0604030504040204" pitchFamily="34" charset="0"/>
+                <a:ea typeface="Tahoma" panose="020B0604030504040204" pitchFamily="34" charset="0"/>
+                <a:cs typeface="Tahoma" panose="020B0604030504040204" pitchFamily="34" charset="0"/>
               </a:rPr>
               <a:t>D</a:t>
             </a:r>
             <a:r>
-              <a:rPr lang="vi-VN" sz="2800" i="1" dirty="0">
-                <a:latin typeface="Times New Roman" panose="02020603050405020304" pitchFamily="18" charset="0"/>
-                <a:cs typeface="Times New Roman" panose="02020603050405020304" pitchFamily="18" charset="0"/>
+              <a:rPr lang="vi-VN" sz="2400" dirty="0">
+                <a:latin typeface="Tahoma" panose="020B0604030504040204" pitchFamily="34" charset="0"/>
+                <a:ea typeface="Tahoma" panose="020B0604030504040204" pitchFamily="34" charset="0"/>
+                <a:cs typeface="Tahoma" panose="020B0604030504040204" pitchFamily="34" charset="0"/>
               </a:rPr>
               <a:t>eployment </a:t>
             </a:r>
             <a:r>
-              <a:rPr lang="en-US" sz="2800" i="1" dirty="0">
-                <a:latin typeface="Times New Roman" panose="02020603050405020304" pitchFamily="18" charset="0"/>
-                <a:cs typeface="Times New Roman" panose="02020603050405020304" pitchFamily="18" charset="0"/>
+              <a:rPr lang="en-US" sz="2400" dirty="0">
+                <a:latin typeface="Tahoma" panose="020B0604030504040204" pitchFamily="34" charset="0"/>
+                <a:ea typeface="Tahoma" panose="020B0604030504040204" pitchFamily="34" charset="0"/>
+                <a:cs typeface="Tahoma" panose="020B0604030504040204" pitchFamily="34" charset="0"/>
               </a:rPr>
               <a:t>d</a:t>
             </a:r>
             <a:r>
-              <a:rPr lang="vi-VN" sz="2800" i="1" dirty="0">
-                <a:latin typeface="Times New Roman" panose="02020603050405020304" pitchFamily="18" charset="0"/>
-                <a:cs typeface="Times New Roman" panose="02020603050405020304" pitchFamily="18" charset="0"/>
+              <a:rPr lang="vi-VN" sz="2400" dirty="0">
+                <a:latin typeface="Tahoma" panose="020B0604030504040204" pitchFamily="34" charset="0"/>
+                <a:ea typeface="Tahoma" panose="020B0604030504040204" pitchFamily="34" charset="0"/>
+                <a:cs typeface="Tahoma" panose="020B0604030504040204" pitchFamily="34" charset="0"/>
               </a:rPr>
               <a:t>iagram</a:t>
             </a:r>
+            <a:endParaRPr lang="en-US" sz="2400" dirty="0">
+              <a:latin typeface="Tahoma" panose="020B0604030504040204" pitchFamily="34" charset="0"/>
+              <a:ea typeface="Tahoma" panose="020B0604030504040204" pitchFamily="34" charset="0"/>
+              <a:cs typeface="Tahoma" panose="020B0604030504040204" pitchFamily="34" charset="0"/>
+            </a:endParaRPr>
+          </a:p>
+          <a:p>
+            <a:pPr marL="457200" lvl="1" indent="0">
+              <a:buNone/>
+            </a:pPr>
             <a:endParaRPr lang="en-US" altLang="ko-KR" sz="2800" i="1" dirty="0">
-              <a:latin typeface="Times New Roman" panose="02020603050405020304" pitchFamily="18" charset="0"/>
-              <a:ea typeface="Gulim" panose="020B0600000101010101" pitchFamily="34" charset="-127"/>
-              <a:cs typeface="Times New Roman" panose="02020603050405020304" pitchFamily="18" charset="0"/>
+              <a:latin typeface="Tahoma" panose="020B0604030504040204" pitchFamily="34" charset="0"/>
+              <a:ea typeface="Tahoma" panose="020B0604030504040204" pitchFamily="34" charset="0"/>
+              <a:cs typeface="Tahoma" panose="020B0604030504040204" pitchFamily="34" charset="0"/>
             </a:endParaRPr>
           </a:p>
           <a:p>
             <a:pPr eaLnBrk="1" hangingPunct="1"/>
             <a:r>
               <a:rPr lang="en-US" altLang="ko-KR" sz="2800" dirty="0">
-                <a:latin typeface="Times New Roman" panose="02020603050405020304" pitchFamily="18" charset="0"/>
-                <a:ea typeface="Gulim" panose="020B0600000101010101" pitchFamily="34" charset="-127"/>
-                <a:cs typeface="Times New Roman" panose="02020603050405020304" pitchFamily="18" charset="0"/>
+                <a:latin typeface="Tahoma" panose="020B0604030504040204" pitchFamily="34" charset="0"/>
+                <a:ea typeface="Tahoma" panose="020B0604030504040204" pitchFamily="34" charset="0"/>
+                <a:cs typeface="Tahoma" panose="020B0604030504040204" pitchFamily="34" charset="0"/>
               </a:rPr>
               <a:t>Test result</a:t>
             </a:r>
@@ -14408,9 +14417,9 @@
             <a:pPr eaLnBrk="1" hangingPunct="1"/>
             <a:r>
               <a:rPr lang="en-US" altLang="ko-KR" sz="2800" dirty="0">
-                <a:latin typeface="Times New Roman" panose="02020603050405020304" pitchFamily="18" charset="0"/>
-                <a:ea typeface="Gulim" panose="020B0600000101010101" pitchFamily="34" charset="-127"/>
-                <a:cs typeface="Times New Roman" panose="02020603050405020304" pitchFamily="18" charset="0"/>
+                <a:latin typeface="Tahoma" panose="020B0604030504040204" pitchFamily="34" charset="0"/>
+                <a:ea typeface="Tahoma" panose="020B0604030504040204" pitchFamily="34" charset="0"/>
+                <a:cs typeface="Tahoma" panose="020B0604030504040204" pitchFamily="34" charset="0"/>
               </a:rPr>
               <a:t>Conclusion and development</a:t>
             </a:r>
@@ -14418,9 +14427,9 @@
           <a:p>
             <a:r>
               <a:rPr lang="en-US" altLang="ko-KR" sz="2800" dirty="0">
-                <a:latin typeface="Times New Roman" panose="02020603050405020304" pitchFamily="18" charset="0"/>
-                <a:ea typeface="Gulim" panose="020B0600000101010101" pitchFamily="34" charset="-127"/>
-                <a:cs typeface="Times New Roman" panose="02020603050405020304" pitchFamily="18" charset="0"/>
+                <a:latin typeface="Tahoma" panose="020B0604030504040204" pitchFamily="34" charset="0"/>
+                <a:ea typeface="Tahoma" panose="020B0604030504040204" pitchFamily="34" charset="0"/>
+                <a:cs typeface="Tahoma" panose="020B0604030504040204" pitchFamily="34" charset="0"/>
               </a:rPr>
               <a:t>Task list</a:t>
             </a:r>
@@ -14428,17 +14437,17 @@
           <a:p>
             <a:pPr eaLnBrk="1" hangingPunct="1"/>
             <a:endParaRPr lang="vi-VN" altLang="ko-KR" sz="2800" dirty="0">
-              <a:latin typeface="Times New Roman" panose="02020603050405020304" pitchFamily="18" charset="0"/>
-              <a:ea typeface="Gulim" panose="020B0600000101010101" pitchFamily="34" charset="-127"/>
-              <a:cs typeface="Times New Roman" panose="02020603050405020304" pitchFamily="18" charset="0"/>
+              <a:latin typeface="Tahoma" panose="020B0604030504040204" pitchFamily="34" charset="0"/>
+              <a:ea typeface="Tahoma" panose="020B0604030504040204" pitchFamily="34" charset="0"/>
+              <a:cs typeface="Tahoma" panose="020B0604030504040204" pitchFamily="34" charset="0"/>
             </a:endParaRPr>
           </a:p>
           <a:p>
             <a:pPr eaLnBrk="1" hangingPunct="1"/>
             <a:endParaRPr lang="en-US" altLang="en-US" dirty="0">
-              <a:latin typeface="Arial" panose="020B0604020202020204" pitchFamily="34" charset="0"/>
-              <a:ea typeface="Gulim" panose="020B0600000101010101" pitchFamily="34" charset="-127"/>
-              <a:cs typeface="Times New Roman" panose="02020603050405020304" pitchFamily="18" charset="0"/>
+              <a:latin typeface="Tahoma" panose="020B0604030504040204" pitchFamily="34" charset="0"/>
+              <a:ea typeface="Tahoma" panose="020B0604030504040204" pitchFamily="34" charset="0"/>
+              <a:cs typeface="Tahoma" panose="020B0604030504040204" pitchFamily="34" charset="0"/>
             </a:endParaRPr>
           </a:p>
         </p:txBody>
@@ -14537,7 +14546,7 @@
             <p:ph idx="1"/>
             <p:extLst>
               <p:ext uri="{D42A27DB-BD31-4B8C-83A1-F6EECF244321}">
-                <p14:modId xmlns:p14="http://schemas.microsoft.com/office/powerpoint/2010/main" val="2380273724"/>
+                <p14:modId xmlns:p14="http://schemas.microsoft.com/office/powerpoint/2010/main" val="1063198094"/>
               </p:ext>
             </p:extLst>
           </p:nvPr>
@@ -14708,13 +14717,17 @@
           <a:p>
             <a:r>
               <a:rPr lang="en-US" b="1" dirty="0">
-                <a:latin typeface="+mn-lt"/>
+                <a:latin typeface="Tahoma" panose="020B0604030504040204" pitchFamily="34" charset="0"/>
+                <a:ea typeface="Tahoma" panose="020B0604030504040204" pitchFamily="34" charset="0"/>
+                <a:cs typeface="Tahoma" panose="020B0604030504040204" pitchFamily="34" charset="0"/>
               </a:rPr>
               <a:t>Functional</a:t>
             </a:r>
             <a:r>
               <a:rPr lang="en-US" dirty="0">
-                <a:latin typeface="+mn-lt"/>
+                <a:latin typeface="Tahoma" panose="020B0604030504040204" pitchFamily="34" charset="0"/>
+                <a:ea typeface="Tahoma" panose="020B0604030504040204" pitchFamily="34" charset="0"/>
+                <a:cs typeface="Tahoma" panose="020B0604030504040204" pitchFamily="34" charset="0"/>
               </a:rPr>
               <a:t> </a:t>
             </a:r>
@@ -14723,7 +14736,9 @@
             <a:pPr lvl="1"/>
             <a:r>
               <a:rPr lang="en-US" dirty="0">
-                <a:latin typeface="+mn-lt"/>
+                <a:latin typeface="Tahoma" panose="020B0604030504040204" pitchFamily="34" charset="0"/>
+                <a:ea typeface="Tahoma" panose="020B0604030504040204" pitchFamily="34" charset="0"/>
+                <a:cs typeface="Tahoma" panose="020B0604030504040204" pitchFamily="34" charset="0"/>
               </a:rPr>
               <a:t>Admin:</a:t>
             </a:r>
@@ -14732,7 +14747,9 @@
             <a:pPr lvl="2"/>
             <a:r>
               <a:rPr lang="en-US" dirty="0">
-                <a:latin typeface="+mn-lt"/>
+                <a:latin typeface="Tahoma" panose="020B0604030504040204" pitchFamily="34" charset="0"/>
+                <a:ea typeface="Tahoma" panose="020B0604030504040204" pitchFamily="34" charset="0"/>
+                <a:cs typeface="Tahoma" panose="020B0604030504040204" pitchFamily="34" charset="0"/>
               </a:rPr>
               <a:t>View; </a:t>
             </a:r>
@@ -14741,7 +14758,9 @@
             <a:pPr lvl="2"/>
             <a:r>
               <a:rPr lang="en-US" dirty="0">
-                <a:latin typeface="+mn-lt"/>
+                <a:latin typeface="Tahoma" panose="020B0604030504040204" pitchFamily="34" charset="0"/>
+                <a:ea typeface="Tahoma" panose="020B0604030504040204" pitchFamily="34" charset="0"/>
+                <a:cs typeface="Tahoma" panose="020B0604030504040204" pitchFamily="34" charset="0"/>
               </a:rPr>
               <a:t>Update (existing product) gallery, services.. ;</a:t>
             </a:r>
@@ -14750,7 +14769,9 @@
             <a:pPr lvl="2"/>
             <a:r>
               <a:rPr lang="en-US" dirty="0">
-                <a:latin typeface="+mn-lt"/>
+                <a:latin typeface="Tahoma" panose="020B0604030504040204" pitchFamily="34" charset="0"/>
+                <a:ea typeface="Tahoma" panose="020B0604030504040204" pitchFamily="34" charset="0"/>
+                <a:cs typeface="Tahoma" panose="020B0604030504040204" pitchFamily="34" charset="0"/>
               </a:rPr>
               <a:t>Delete Product (supper admin role)</a:t>
             </a:r>
@@ -14759,7 +14780,9 @@
             <a:pPr lvl="1"/>
             <a:r>
               <a:rPr lang="en-US" dirty="0">
-                <a:latin typeface="+mn-lt"/>
+                <a:latin typeface="Tahoma" panose="020B0604030504040204" pitchFamily="34" charset="0"/>
+                <a:ea typeface="Tahoma" panose="020B0604030504040204" pitchFamily="34" charset="0"/>
+                <a:cs typeface="Tahoma" panose="020B0604030504040204" pitchFamily="34" charset="0"/>
               </a:rPr>
               <a:t>User:</a:t>
             </a:r>
@@ -14768,7 +14791,9 @@
             <a:pPr lvl="2"/>
             <a:r>
               <a:rPr lang="en-US" dirty="0">
-                <a:latin typeface="+mn-lt"/>
+                <a:latin typeface="Tahoma" panose="020B0604030504040204" pitchFamily="34" charset="0"/>
+                <a:ea typeface="Tahoma" panose="020B0604030504040204" pitchFamily="34" charset="0"/>
+                <a:cs typeface="Tahoma" panose="020B0604030504040204" pitchFamily="34" charset="0"/>
               </a:rPr>
               <a:t>Search for service, product, partner to date with.</a:t>
             </a:r>
@@ -14777,7 +14802,9 @@
             <a:pPr lvl="2"/>
             <a:r>
               <a:rPr lang="en-US" dirty="0">
-                <a:latin typeface="+mn-lt"/>
+                <a:latin typeface="Tahoma" panose="020B0604030504040204" pitchFamily="34" charset="0"/>
+                <a:ea typeface="Tahoma" panose="020B0604030504040204" pitchFamily="34" charset="0"/>
+                <a:cs typeface="Tahoma" panose="020B0604030504040204" pitchFamily="34" charset="0"/>
               </a:rPr>
               <a:t>Register account</a:t>
             </a:r>
@@ -14786,7 +14813,9 @@
             <a:pPr lvl="2"/>
             <a:r>
               <a:rPr lang="en-US" dirty="0">
-                <a:latin typeface="+mn-lt"/>
+                <a:latin typeface="Tahoma" panose="020B0604030504040204" pitchFamily="34" charset="0"/>
+                <a:ea typeface="Tahoma" panose="020B0604030504040204" pitchFamily="34" charset="0"/>
+                <a:cs typeface="Tahoma" panose="020B0604030504040204" pitchFamily="34" charset="0"/>
               </a:rPr>
               <a:t>Book service: pet care, pet grooming, pet hotel</a:t>
             </a:r>
@@ -14795,7 +14824,9 @@
             <a:pPr lvl="2"/>
             <a:r>
               <a:rPr lang="en-US" dirty="0">
-                <a:latin typeface="+mn-lt"/>
+                <a:latin typeface="Tahoma" panose="020B0604030504040204" pitchFamily="34" charset="0"/>
+                <a:ea typeface="Tahoma" panose="020B0604030504040204" pitchFamily="34" charset="0"/>
+                <a:cs typeface="Tahoma" panose="020B0604030504040204" pitchFamily="34" charset="0"/>
               </a:rPr>
               <a:t>Buy products: food, carrier, toy, kennel, collar, treatment products..</a:t>
             </a:r>
@@ -14804,7 +14835,9 @@
             <a:pPr lvl="2"/>
             <a:r>
               <a:rPr lang="en-US" dirty="0">
-                <a:latin typeface="+mn-lt"/>
+                <a:latin typeface="Tahoma" panose="020B0604030504040204" pitchFamily="34" charset="0"/>
+                <a:ea typeface="Tahoma" panose="020B0604030504040204" pitchFamily="34" charset="0"/>
+                <a:cs typeface="Tahoma" panose="020B0604030504040204" pitchFamily="34" charset="0"/>
               </a:rPr>
               <a:t>Take part in Pet dating club</a:t>
             </a:r>
@@ -14814,7 +14847,9 @@
               <a:buNone/>
             </a:pPr>
             <a:endParaRPr lang="en-US" dirty="0">
-              <a:latin typeface="+mn-lt"/>
+              <a:latin typeface="Tahoma" panose="020B0604030504040204" pitchFamily="34" charset="0"/>
+              <a:ea typeface="Tahoma" panose="020B0604030504040204" pitchFamily="34" charset="0"/>
+              <a:cs typeface="Tahoma" panose="020B0604030504040204" pitchFamily="34" charset="0"/>
             </a:endParaRPr>
           </a:p>
         </p:txBody>
@@ -16932,7 +16967,7 @@
           <p:nvPr>
             <p:extLst>
               <p:ext uri="{D42A27DB-BD31-4B8C-83A1-F6EECF244321}">
-                <p14:modId xmlns:p14="http://schemas.microsoft.com/office/powerpoint/2010/main" val="2586866588"/>
+                <p14:modId xmlns:p14="http://schemas.microsoft.com/office/powerpoint/2010/main" val="1549591869"/>
               </p:ext>
             </p:extLst>
           </p:nvPr>

</xml_diff>